<commit_message>
update ppt for Lab A
</commit_message>
<xml_diff>
--- a/Resilience Project/QP Lab A Presentation.pptx
+++ b/Resilience Project/QP Lab A Presentation.pptx
@@ -21,6 +21,7 @@
     <p:sldId id="266" r:id="rId16"/>
     <p:sldId id="267" r:id="rId17"/>
     <p:sldId id="268" r:id="rId18"/>
+    <p:sldId id="269" r:id="rId19"/>
   </p:sldIdLst>
   <p:sldSz cy="6858000" cx="9144000"/>
   <p:notesSz cx="6858000" cy="9144000"/>
@@ -602,7 +603,7 @@
   <p:cSld>
     <p:spTree>
       <p:nvGrpSpPr>
-        <p:cNvPr id="103" name="Shape 103"/>
+        <p:cNvPr id="104" name="Shape 104"/>
         <p:cNvGrpSpPr/>
         <p:nvPr/>
       </p:nvGrpSpPr>
@@ -616,7 +617,7 @@
       </p:grpSpPr>
       <p:sp>
         <p:nvSpPr>
-          <p:cNvPr id="104" name="Shape 104"/>
+          <p:cNvPr id="105" name="Shape 105"/>
           <p:cNvSpPr/>
           <p:nvPr>
             <p:ph idx="2" type="sldImg"/>
@@ -660,7 +661,7 @@
       </p:sp>
       <p:sp>
         <p:nvSpPr>
-          <p:cNvPr id="105" name="Shape 105"/>
+          <p:cNvPr id="106" name="Shape 106"/>
           <p:cNvSpPr txBox="1"/>
           <p:nvPr>
             <p:ph idx="1" type="body"/>
@@ -707,7 +708,7 @@
   <p:cSld>
     <p:spTree>
       <p:nvGrpSpPr>
-        <p:cNvPr id="128" name="Shape 128"/>
+        <p:cNvPr id="110" name="Shape 110"/>
         <p:cNvGrpSpPr/>
         <p:nvPr/>
       </p:nvGrpSpPr>
@@ -721,7 +722,7 @@
       </p:grpSpPr>
       <p:sp>
         <p:nvSpPr>
-          <p:cNvPr id="129" name="Shape 129"/>
+          <p:cNvPr id="111" name="Shape 111"/>
           <p:cNvSpPr/>
           <p:nvPr>
             <p:ph idx="2" type="sldImg"/>
@@ -765,7 +766,7 @@
       </p:sp>
       <p:sp>
         <p:nvSpPr>
-          <p:cNvPr id="130" name="Shape 130"/>
+          <p:cNvPr id="112" name="Shape 112"/>
           <p:cNvSpPr txBox="1"/>
           <p:nvPr>
             <p:ph idx="1" type="body"/>
@@ -812,7 +813,7 @@
   <p:cSld>
     <p:spTree>
       <p:nvGrpSpPr>
-        <p:cNvPr id="134" name="Shape 134"/>
+        <p:cNvPr id="135" name="Shape 135"/>
         <p:cNvGrpSpPr/>
         <p:nvPr/>
       </p:nvGrpSpPr>
@@ -826,7 +827,7 @@
       </p:grpSpPr>
       <p:sp>
         <p:nvSpPr>
-          <p:cNvPr id="135" name="Shape 135"/>
+          <p:cNvPr id="136" name="Shape 136"/>
           <p:cNvSpPr/>
           <p:nvPr>
             <p:ph idx="2" type="sldImg"/>
@@ -870,7 +871,112 @@
       </p:sp>
       <p:sp>
         <p:nvSpPr>
-          <p:cNvPr id="136" name="Shape 136"/>
+          <p:cNvPr id="137" name="Shape 137"/>
+          <p:cNvSpPr txBox="1"/>
+          <p:nvPr>
+            <p:ph idx="1" type="body"/>
+          </p:nvPr>
+        </p:nvSpPr>
+        <p:spPr>
+          <a:xfrm>
+            <a:off x="685800" y="4343400"/>
+            <a:ext cx="5486399" cy="4114800"/>
+          </a:xfrm>
+          <a:prstGeom prst="rect">
+            <a:avLst/>
+          </a:prstGeom>
+        </p:spPr>
+        <p:txBody>
+          <a:bodyPr anchorCtr="0" anchor="t" bIns="91425" lIns="91425" rIns="91425" tIns="91425">
+            <a:noAutofit/>
+          </a:bodyPr>
+          <a:lstStyle/>
+          <a:p>
+            <a:pPr>
+              <a:spcBef>
+                <a:spcPts val="0"/>
+              </a:spcBef>
+              <a:buNone/>
+            </a:pPr>
+            <a:r>
+              <a:t/>
+            </a:r>
+            <a:endParaRPr/>
+          </a:p>
+        </p:txBody>
+      </p:sp>
+    </p:spTree>
+  </p:cSld>
+  <p:clrMapOvr>
+    <a:masterClrMapping/>
+  </p:clrMapOvr>
+</p:notes>
+</file>
+
+<file path=ppt/notesSlides/notesSlide14.xml><?xml version="1.0" encoding="utf-8"?>
+<p:notes xmlns:a="http://schemas.openxmlformats.org/drawingml/2006/main" xmlns:r="http://schemas.openxmlformats.org/officeDocument/2006/relationships" xmlns:mc="http://schemas.openxmlformats.org/markup-compatibility/2006" xmlns:mv="urn:schemas-microsoft-com:mac:vml" xmlns:p="http://schemas.openxmlformats.org/presentationml/2006/main" xmlns:c="http://schemas.openxmlformats.org/drawingml/2006/chart" xmlns:dgm="http://schemas.openxmlformats.org/drawingml/2006/diagram" xmlns:o="urn:schemas-microsoft-com:office:office" xmlns:v="urn:schemas-microsoft-com:vml" xmlns:pvml="urn:schemas-microsoft-com:office:powerpoint" xmlns:com="http://schemas.openxmlformats.org/drawingml/2006/compatibility" xmlns:p14="http://schemas.microsoft.com/office/powerpoint/2010/main" showMasterPhAnim="0" showMasterSp="0">
+  <p:cSld>
+    <p:spTree>
+      <p:nvGrpSpPr>
+        <p:cNvPr id="141" name="Shape 141"/>
+        <p:cNvGrpSpPr/>
+        <p:nvPr/>
+      </p:nvGrpSpPr>
+      <p:grpSpPr>
+        <a:xfrm>
+          <a:off x="0" y="0"/>
+          <a:ext cx="0" cy="0"/>
+          <a:chOff x="0" y="0"/>
+          <a:chExt cx="0" cy="0"/>
+        </a:xfrm>
+      </p:grpSpPr>
+      <p:sp>
+        <p:nvSpPr>
+          <p:cNvPr id="142" name="Shape 142"/>
+          <p:cNvSpPr/>
+          <p:nvPr>
+            <p:ph idx="2" type="sldImg"/>
+          </p:nvPr>
+        </p:nvSpPr>
+        <p:spPr>
+          <a:xfrm>
+            <a:off x="1143225" y="685800"/>
+            <a:ext cx="4572299" cy="3429000"/>
+          </a:xfrm>
+          <a:custGeom>
+            <a:pathLst>
+              <a:path extrusionOk="0" h="120000" w="120000">
+                <a:moveTo>
+                  <a:pt x="0" y="0"/>
+                </a:moveTo>
+                <a:lnTo>
+                  <a:pt x="120000" y="0"/>
+                </a:lnTo>
+                <a:lnTo>
+                  <a:pt x="120000" y="120000"/>
+                </a:lnTo>
+                <a:lnTo>
+                  <a:pt x="0" y="120000"/>
+                </a:lnTo>
+                <a:close/>
+              </a:path>
+            </a:pathLst>
+          </a:custGeom>
+          <a:noFill/>
+          <a:ln cap="flat" w="9525">
+            <a:solidFill>
+              <a:srgbClr val="000000"/>
+            </a:solidFill>
+            <a:prstDash val="solid"/>
+            <a:round/>
+            <a:headEnd len="med" w="med" type="none"/>
+            <a:tailEnd len="med" w="med" type="none"/>
+          </a:ln>
+        </p:spPr>
+      </p:sp>
+      <p:sp>
+        <p:nvSpPr>
+          <p:cNvPr id="143" name="Shape 143"/>
           <p:cNvSpPr txBox="1"/>
           <p:nvPr>
             <p:ph idx="1" type="body"/>
@@ -1232,7 +1338,7 @@
   <p:cSld>
     <p:spTree>
       <p:nvGrpSpPr>
-        <p:cNvPr id="65" name="Shape 65"/>
+        <p:cNvPr id="64" name="Shape 64"/>
         <p:cNvGrpSpPr/>
         <p:nvPr/>
       </p:nvGrpSpPr>
@@ -1246,7 +1352,7 @@
       </p:grpSpPr>
       <p:sp>
         <p:nvSpPr>
-          <p:cNvPr id="66" name="Shape 66"/>
+          <p:cNvPr id="65" name="Shape 65"/>
           <p:cNvSpPr/>
           <p:nvPr>
             <p:ph idx="2" type="sldImg"/>
@@ -1290,7 +1396,7 @@
       </p:sp>
       <p:sp>
         <p:nvSpPr>
-          <p:cNvPr id="67" name="Shape 67"/>
+          <p:cNvPr id="66" name="Shape 66"/>
           <p:cNvSpPr txBox="1"/>
           <p:nvPr>
             <p:ph idx="1" type="body"/>
@@ -1442,7 +1548,7 @@
   <p:cSld>
     <p:spTree>
       <p:nvGrpSpPr>
-        <p:cNvPr id="78" name="Shape 78"/>
+        <p:cNvPr id="79" name="Shape 79"/>
         <p:cNvGrpSpPr/>
         <p:nvPr/>
       </p:nvGrpSpPr>
@@ -1456,7 +1562,7 @@
       </p:grpSpPr>
       <p:sp>
         <p:nvSpPr>
-          <p:cNvPr id="79" name="Shape 79"/>
+          <p:cNvPr id="80" name="Shape 80"/>
           <p:cNvSpPr/>
           <p:nvPr>
             <p:ph idx="2" type="sldImg"/>
@@ -1500,7 +1606,7 @@
       </p:sp>
       <p:sp>
         <p:nvSpPr>
-          <p:cNvPr id="80" name="Shape 80"/>
+          <p:cNvPr id="81" name="Shape 81"/>
           <p:cNvSpPr txBox="1"/>
           <p:nvPr>
             <p:ph idx="1" type="body"/>
@@ -1547,7 +1653,7 @@
   <p:cSld>
     <p:spTree>
       <p:nvGrpSpPr>
-        <p:cNvPr id="84" name="Shape 84"/>
+        <p:cNvPr id="85" name="Shape 85"/>
         <p:cNvGrpSpPr/>
         <p:nvPr/>
       </p:nvGrpSpPr>
@@ -1561,7 +1667,7 @@
       </p:grpSpPr>
       <p:sp>
         <p:nvSpPr>
-          <p:cNvPr id="85" name="Shape 85"/>
+          <p:cNvPr id="86" name="Shape 86"/>
           <p:cNvSpPr/>
           <p:nvPr>
             <p:ph idx="2" type="sldImg"/>
@@ -1605,7 +1711,7 @@
       </p:sp>
       <p:sp>
         <p:nvSpPr>
-          <p:cNvPr id="86" name="Shape 86"/>
+          <p:cNvPr id="87" name="Shape 87"/>
           <p:cNvSpPr txBox="1"/>
           <p:nvPr>
             <p:ph idx="1" type="body"/>
@@ -1652,7 +1758,7 @@
   <p:cSld>
     <p:spTree>
       <p:nvGrpSpPr>
-        <p:cNvPr id="90" name="Shape 90"/>
+        <p:cNvPr id="91" name="Shape 91"/>
         <p:cNvGrpSpPr/>
         <p:nvPr/>
       </p:nvGrpSpPr>
@@ -1666,7 +1772,7 @@
       </p:grpSpPr>
       <p:sp>
         <p:nvSpPr>
-          <p:cNvPr id="91" name="Shape 91"/>
+          <p:cNvPr id="92" name="Shape 92"/>
           <p:cNvSpPr/>
           <p:nvPr>
             <p:ph idx="2" type="sldImg"/>
@@ -1710,7 +1816,7 @@
       </p:sp>
       <p:sp>
         <p:nvSpPr>
-          <p:cNvPr id="92" name="Shape 92"/>
+          <p:cNvPr id="93" name="Shape 93"/>
           <p:cNvSpPr txBox="1"/>
           <p:nvPr>
             <p:ph idx="1" type="body"/>
@@ -4179,7 +4285,7 @@
   <p:cSld>
     <p:spTree>
       <p:nvGrpSpPr>
-        <p:cNvPr id="93" name="Shape 93"/>
+        <p:cNvPr id="94" name="Shape 94"/>
         <p:cNvGrpSpPr/>
         <p:nvPr/>
       </p:nvGrpSpPr>
@@ -4193,7 +4299,7 @@
       </p:grpSpPr>
       <p:sp>
         <p:nvSpPr>
-          <p:cNvPr id="94" name="Shape 94"/>
+          <p:cNvPr id="95" name="Shape 95"/>
           <p:cNvSpPr txBox="1"/>
           <p:nvPr>
             <p:ph type="title"/>
@@ -4222,14 +4328,14 @@
             </a:pPr>
             <a:r>
               <a:rPr lang="en"/>
-              <a:t>Homeostasis</a:t>
+              <a:t>Experimental Design</a:t>
             </a:r>
           </a:p>
         </p:txBody>
       </p:sp>
       <p:sp>
         <p:nvSpPr>
-          <p:cNvPr id="95" name="Shape 95"/>
+          <p:cNvPr id="96" name="Shape 96"/>
           <p:cNvSpPr txBox="1"/>
           <p:nvPr>
             <p:ph idx="1" type="body"/>
@@ -4237,8 +4343,8 @@
         </p:nvSpPr>
         <p:spPr>
           <a:xfrm>
-            <a:off x="4656600" y="1964032"/>
-            <a:ext cx="4030200" cy="4620299"/>
+            <a:off x="457200" y="1947332"/>
+            <a:ext cx="8229600" cy="4620299"/>
           </a:xfrm>
           <a:prstGeom prst="rect">
             <a:avLst/>
@@ -4250,68 +4356,6 @@
           </a:bodyPr>
           <a:lstStyle/>
           <a:p>
-            <a:pPr rtl="0">
-              <a:spcBef>
-                <a:spcPts val="0"/>
-              </a:spcBef>
-              <a:buNone/>
-            </a:pPr>
-            <a:r>
-              <a:rPr lang="en"/>
-              <a:t>The ability of an organism to maintain physiological functions needed for survival.</a:t>
-            </a:r>
-          </a:p>
-          <a:p>
-            <a:pPr rtl="0">
-              <a:spcBef>
-                <a:spcPts val="0"/>
-              </a:spcBef>
-              <a:buNone/>
-            </a:pPr>
-            <a:r>
-              <a:t/>
-            </a:r>
-            <a:endParaRPr/>
-          </a:p>
-          <a:p>
-            <a:pPr>
-              <a:spcBef>
-                <a:spcPts val="0"/>
-              </a:spcBef>
-              <a:buNone/>
-            </a:pPr>
-            <a:r>
-              <a:rPr lang="en"/>
-              <a:t>Homeostasis is challenged by internal and external stressors. </a:t>
-            </a:r>
-          </a:p>
-        </p:txBody>
-      </p:sp>
-      <p:sp>
-        <p:nvSpPr>
-          <p:cNvPr id="96" name="Shape 96"/>
-          <p:cNvSpPr txBox="1"/>
-          <p:nvPr/>
-        </p:nvSpPr>
-        <p:spPr>
-          <a:xfrm>
-            <a:off x="242175" y="1963975"/>
-            <a:ext cx="4250400" cy="4620299"/>
-          </a:xfrm>
-          <a:prstGeom prst="rect">
-            <a:avLst/>
-          </a:prstGeom>
-          <a:noFill/>
-          <a:ln>
-            <a:noFill/>
-          </a:ln>
-        </p:spPr>
-        <p:txBody>
-          <a:bodyPr anchorCtr="0" anchor="t" bIns="91425" lIns="91425" rIns="91425" tIns="91425">
-            <a:noAutofit/>
-          </a:bodyPr>
-          <a:lstStyle/>
-          <a:p>
             <a:pPr indent="-419100" lvl="0" marL="457200" rtl="0">
               <a:lnSpc>
                 <a:spcPct val="150000"/>
@@ -4320,15 +4364,15 @@
                 <a:spcPts val="0"/>
               </a:spcBef>
               <a:buClr>
-                <a:srgbClr val="000000"/>
+                <a:schemeClr val="dk2"/>
               </a:buClr>
               <a:buSzPct val="100000"/>
               <a:buFont typeface="Arial"/>
               <a:buChar char="●"/>
             </a:pPr>
             <a:r>
-              <a:rPr lang="en" sz="3000"/>
-              <a:t>What is Homeostasis?</a:t>
+              <a:rPr lang="en"/>
+              <a:t>What do you need to run your experiment?</a:t>
             </a:r>
           </a:p>
           <a:p>
@@ -4340,19 +4384,19 @@
                 <a:spcPts val="0"/>
               </a:spcBef>
               <a:buClr>
-                <a:srgbClr val="000000"/>
+                <a:schemeClr val="dk2"/>
               </a:buClr>
               <a:buSzPct val="100000"/>
               <a:buFont typeface="Arial"/>
               <a:buChar char="●"/>
             </a:pPr>
             <a:r>
-              <a:rPr lang="en" sz="3000"/>
-              <a:t>Why is it important?</a:t>
+              <a:rPr lang="en"/>
+              <a:t>What do you have to control?</a:t>
             </a:r>
           </a:p>
           <a:p>
-            <a:pPr indent="-419100" lvl="0" marL="457200">
+            <a:pPr indent="-419100" lvl="0" marL="457200" rtl="0">
               <a:lnSpc>
                 <a:spcPct val="150000"/>
               </a:lnSpc>
@@ -4360,16 +4404,68 @@
                 <a:spcPts val="0"/>
               </a:spcBef>
               <a:buClr>
-                <a:srgbClr val="000000"/>
+                <a:schemeClr val="dk2"/>
               </a:buClr>
               <a:buSzPct val="100000"/>
               <a:buFont typeface="Arial"/>
               <a:buChar char="●"/>
             </a:pPr>
             <a:r>
-              <a:rPr lang="en" sz="3000"/>
-              <a:t>What is homeostasis in shellfish?</a:t>
+              <a:rPr lang="en"/>
+              <a:t>What can you not control?</a:t>
             </a:r>
+          </a:p>
+          <a:p>
+            <a:pPr indent="-419100" lvl="0" marL="457200" rtl="0">
+              <a:lnSpc>
+                <a:spcPct val="150000"/>
+              </a:lnSpc>
+              <a:spcBef>
+                <a:spcPts val="0"/>
+              </a:spcBef>
+              <a:buClr>
+                <a:schemeClr val="dk2"/>
+              </a:buClr>
+              <a:buSzPct val="100000"/>
+              <a:buFont typeface="Arial"/>
+              <a:buChar char="●"/>
+            </a:pPr>
+            <a:r>
+              <a:rPr lang="en"/>
+              <a:t>How will you collect samples?</a:t>
+            </a:r>
+          </a:p>
+          <a:p>
+            <a:pPr indent="-419100" lvl="0" marL="457200" rtl="0">
+              <a:lnSpc>
+                <a:spcPct val="150000"/>
+              </a:lnSpc>
+              <a:spcBef>
+                <a:spcPts val="0"/>
+              </a:spcBef>
+              <a:buClr>
+                <a:schemeClr val="dk2"/>
+              </a:buClr>
+              <a:buSzPct val="100000"/>
+              <a:buFont typeface="Arial"/>
+              <a:buChar char="●"/>
+            </a:pPr>
+            <a:r>
+              <a:rPr lang="en"/>
+              <a:t>How will you generate data to test?</a:t>
+            </a:r>
+          </a:p>
+          <a:p>
+            <a:pPr>
+              <a:spcBef>
+                <a:spcPts val="0"/>
+              </a:spcBef>
+              <a:buNone/>
+            </a:pPr>
+            <a:r>
+              <a:t/>
+            </a:r>
+            <a:endParaRPr/>
           </a:p>
         </p:txBody>
       </p:sp>
@@ -4598,9 +4694,9 @@
                                           </p:stCondLst>
                                         </p:cTn>
                                         <p:tgtEl>
-                                          <p:spTgt spid="95">
+                                          <p:spTgt spid="96">
                                             <p:txEl>
-                                              <p:pRg end="0" st="0"/>
+                                              <p:pRg end="3" st="3"/>
                                             </p:txEl>
                                           </p:spTgt>
                                         </p:tgtEl>
@@ -4616,9 +4712,9 @@
                                       <p:cBhvr>
                                         <p:cTn dur="1"/>
                                         <p:tgtEl>
-                                          <p:spTgt spid="95">
+                                          <p:spTgt spid="96">
                                             <p:txEl>
-                                              <p:pRg end="0" st="0"/>
+                                              <p:pRg end="3" st="3"/>
                                             </p:txEl>
                                           </p:spTgt>
                                         </p:tgtEl>
@@ -4659,9 +4755,9 @@
                                           </p:stCondLst>
                                         </p:cTn>
                                         <p:tgtEl>
-                                          <p:spTgt spid="95">
+                                          <p:spTgt spid="96">
                                             <p:txEl>
-                                              <p:pRg end="1" st="1"/>
+                                              <p:pRg end="4" st="4"/>
                                             </p:txEl>
                                           </p:spTgt>
                                         </p:tgtEl>
@@ -4677,9 +4773,9 @@
                                       <p:cBhvr>
                                         <p:cTn dur="1"/>
                                         <p:tgtEl>
-                                          <p:spTgt spid="95">
+                                          <p:spTgt spid="96">
                                             <p:txEl>
-                                              <p:pRg end="1" st="1"/>
+                                              <p:pRg end="4" st="4"/>
                                             </p:txEl>
                                           </p:spTgt>
                                         </p:tgtEl>
@@ -4720,9 +4816,9 @@
                                           </p:stCondLst>
                                         </p:cTn>
                                         <p:tgtEl>
-                                          <p:spTgt spid="95">
+                                          <p:spTgt spid="96">
                                             <p:txEl>
-                                              <p:pRg end="2" st="2"/>
+                                              <p:pRg end="5" st="5"/>
                                             </p:txEl>
                                           </p:spTgt>
                                         </p:tgtEl>
@@ -4738,9 +4834,9 @@
                                       <p:cBhvr>
                                         <p:cTn dur="1"/>
                                         <p:tgtEl>
-                                          <p:spTgt spid="95">
+                                          <p:spTgt spid="96">
                                             <p:txEl>
-                                              <p:pRg end="2" st="2"/>
+                                              <p:pRg end="5" st="5"/>
                                             </p:txEl>
                                           </p:spTgt>
                                         </p:tgtEl>
@@ -4828,7 +4924,7 @@
             </a:pPr>
             <a:r>
               <a:rPr lang="en"/>
-              <a:t>Stress Resilience</a:t>
+              <a:t>Homeostasis</a:t>
             </a:r>
           </a:p>
         </p:txBody>
@@ -4843,8 +4939,8 @@
         </p:nvSpPr>
         <p:spPr>
           <a:xfrm>
-            <a:off x="457200" y="1947332"/>
-            <a:ext cx="8229600" cy="4620299"/>
+            <a:off x="4656600" y="1964032"/>
+            <a:ext cx="4030200" cy="4620299"/>
           </a:xfrm>
           <a:prstGeom prst="rect">
             <a:avLst/>
@@ -4856,83 +4952,125 @@
           </a:bodyPr>
           <a:lstStyle/>
           <a:p>
+            <a:pPr rtl="0">
+              <a:spcBef>
+                <a:spcPts val="0"/>
+              </a:spcBef>
+              <a:buNone/>
+            </a:pPr>
+            <a:r>
+              <a:rPr lang="en"/>
+              <a:t>The ability of an organism to maintain physiological functions needed for survival.</a:t>
+            </a:r>
+          </a:p>
+          <a:p>
+            <a:pPr rtl="0">
+              <a:spcBef>
+                <a:spcPts val="0"/>
+              </a:spcBef>
+              <a:buNone/>
+            </a:pPr>
+            <a:r>
+              <a:t/>
+            </a:r>
+            <a:endParaRPr/>
+          </a:p>
+          <a:p>
+            <a:pPr>
+              <a:spcBef>
+                <a:spcPts val="0"/>
+              </a:spcBef>
+              <a:buNone/>
+            </a:pPr>
+            <a:r>
+              <a:rPr lang="en"/>
+              <a:t>Homeostasis is challenged by internal and external stressors. </a:t>
+            </a:r>
+          </a:p>
+        </p:txBody>
+      </p:sp>
+      <p:sp>
+        <p:nvSpPr>
+          <p:cNvPr id="103" name="Shape 103"/>
+          <p:cNvSpPr txBox="1"/>
+          <p:nvPr/>
+        </p:nvSpPr>
+        <p:spPr>
+          <a:xfrm>
+            <a:off x="242175" y="1963975"/>
+            <a:ext cx="4250400" cy="4620299"/>
+          </a:xfrm>
+          <a:prstGeom prst="rect">
+            <a:avLst/>
+          </a:prstGeom>
+          <a:noFill/>
+          <a:ln>
+            <a:noFill/>
+          </a:ln>
+        </p:spPr>
+        <p:txBody>
+          <a:bodyPr anchorCtr="0" anchor="t" bIns="91425" lIns="91425" rIns="91425" tIns="91425">
+            <a:noAutofit/>
+          </a:bodyPr>
+          <a:lstStyle/>
+          <a:p>
             <a:pPr indent="-419100" lvl="0" marL="457200" rtl="0">
               <a:lnSpc>
-                <a:spcPct val="200000"/>
+                <a:spcPct val="150000"/>
               </a:lnSpc>
               <a:spcBef>
                 <a:spcPts val="0"/>
               </a:spcBef>
               <a:buClr>
-                <a:schemeClr val="dk2"/>
+                <a:srgbClr val="000000"/>
               </a:buClr>
               <a:buSzPct val="100000"/>
               <a:buFont typeface="Arial"/>
               <a:buChar char="●"/>
             </a:pPr>
             <a:r>
-              <a:rPr lang="en"/>
-              <a:t>What is Stress Resilience?</a:t>
+              <a:rPr lang="en" sz="3000"/>
+              <a:t>What is Homeostasis?</a:t>
             </a:r>
           </a:p>
           <a:p>
             <a:pPr indent="-419100" lvl="0" marL="457200" rtl="0">
               <a:lnSpc>
-                <a:spcPct val="200000"/>
+                <a:spcPct val="150000"/>
               </a:lnSpc>
               <a:spcBef>
                 <a:spcPts val="0"/>
               </a:spcBef>
               <a:buClr>
-                <a:schemeClr val="dk2"/>
+                <a:srgbClr val="000000"/>
               </a:buClr>
               <a:buSzPct val="100000"/>
               <a:buFont typeface="Arial"/>
               <a:buChar char="●"/>
             </a:pPr>
             <a:r>
-              <a:rPr lang="en"/>
-              <a:t>How can invertebrates resist stress?</a:t>
+              <a:rPr lang="en" sz="3000"/>
+              <a:t>Why is it important?</a:t>
             </a:r>
           </a:p>
           <a:p>
-            <a:pPr indent="-419100" lvl="0" marL="457200" rtl="0">
+            <a:pPr indent="-419100" lvl="0" marL="457200">
               <a:lnSpc>
-                <a:spcPct val="200000"/>
+                <a:spcPct val="150000"/>
               </a:lnSpc>
               <a:spcBef>
                 <a:spcPts val="0"/>
               </a:spcBef>
               <a:buClr>
-                <a:schemeClr val="dk2"/>
+                <a:srgbClr val="000000"/>
               </a:buClr>
               <a:buSzPct val="100000"/>
               <a:buFont typeface="Arial"/>
               <a:buChar char="●"/>
             </a:pPr>
             <a:r>
-              <a:rPr lang="en"/>
-              <a:t>What happens when they fail?</a:t>
-            </a:r>
-          </a:p>
-          <a:p>
-            <a:pPr indent="-419100" lvl="0" marL="457200">
-              <a:lnSpc>
-                <a:spcPct val="200000"/>
-              </a:lnSpc>
-              <a:spcBef>
-                <a:spcPts val="0"/>
-              </a:spcBef>
-              <a:buClr>
-                <a:schemeClr val="dk2"/>
-              </a:buClr>
-              <a:buSzPct val="100000"/>
-              <a:buFont typeface="Arial"/>
-              <a:buChar char="●"/>
-            </a:pPr>
-            <a:r>
-              <a:rPr lang="en"/>
-              <a:t>How would you test their stress resilience?</a:t>
+              <a:rPr lang="en" sz="3000"/>
+              <a:t>What is homeostasis in shellfish?</a:t>
             </a:r>
           </a:p>
         </p:txBody>
@@ -4953,6 +5091,189 @@
             <p:seq concurrent="1" nextAc="seek">
               <p:cTn dur="indefinite" id="2" nodeType="mainSeq">
                 <p:childTnLst>
+                  <p:par>
+                    <p:cTn fill="hold">
+                      <p:stCondLst>
+                        <p:cond delay="indefinite"/>
+                      </p:stCondLst>
+                      <p:childTnLst>
+                        <p:par>
+                          <p:cTn fill="hold">
+                            <p:stCondLst>
+                              <p:cond delay="0"/>
+                            </p:stCondLst>
+                            <p:childTnLst>
+                              <p:par>
+                                <p:cTn fill="hold" nodeType="clickEffect" presetClass="entr" presetID="10" presetSubtype="0">
+                                  <p:stCondLst>
+                                    <p:cond delay="0"/>
+                                  </p:stCondLst>
+                                  <p:childTnLst>
+                                    <p:set>
+                                      <p:cBhvr>
+                                        <p:cTn dur="1" fill="hold">
+                                          <p:stCondLst>
+                                            <p:cond delay="0"/>
+                                          </p:stCondLst>
+                                        </p:cTn>
+                                        <p:tgtEl>
+                                          <p:spTgt spid="103">
+                                            <p:txEl>
+                                              <p:pRg end="0" st="0"/>
+                                            </p:txEl>
+                                          </p:spTgt>
+                                        </p:tgtEl>
+                                        <p:attrNameLst>
+                                          <p:attrName>style.visibility</p:attrName>
+                                        </p:attrNameLst>
+                                      </p:cBhvr>
+                                      <p:to>
+                                        <p:strVal val="visible"/>
+                                      </p:to>
+                                    </p:set>
+                                    <p:animEffect filter="fade" transition="in">
+                                      <p:cBhvr>
+                                        <p:cTn dur="1"/>
+                                        <p:tgtEl>
+                                          <p:spTgt spid="103">
+                                            <p:txEl>
+                                              <p:pRg end="0" st="0"/>
+                                            </p:txEl>
+                                          </p:spTgt>
+                                        </p:tgtEl>
+                                      </p:cBhvr>
+                                    </p:animEffect>
+                                  </p:childTnLst>
+                                </p:cTn>
+                              </p:par>
+                            </p:childTnLst>
+                          </p:cTn>
+                        </p:par>
+                      </p:childTnLst>
+                    </p:cTn>
+                  </p:par>
+                  <p:par>
+                    <p:cTn fill="hold">
+                      <p:stCondLst>
+                        <p:cond delay="indefinite"/>
+                      </p:stCondLst>
+                      <p:childTnLst>
+                        <p:par>
+                          <p:cTn fill="hold">
+                            <p:stCondLst>
+                              <p:cond delay="0"/>
+                            </p:stCondLst>
+                            <p:childTnLst>
+                              <p:par>
+                                <p:cTn fill="hold" nodeType="clickEffect" presetClass="entr" presetID="10" presetSubtype="0">
+                                  <p:stCondLst>
+                                    <p:cond delay="0"/>
+                                  </p:stCondLst>
+                                  <p:childTnLst>
+                                    <p:set>
+                                      <p:cBhvr>
+                                        <p:cTn dur="1" fill="hold">
+                                          <p:stCondLst>
+                                            <p:cond delay="0"/>
+                                          </p:stCondLst>
+                                        </p:cTn>
+                                        <p:tgtEl>
+                                          <p:spTgt spid="103">
+                                            <p:txEl>
+                                              <p:pRg end="1" st="1"/>
+                                            </p:txEl>
+                                          </p:spTgt>
+                                        </p:tgtEl>
+                                        <p:attrNameLst>
+                                          <p:attrName>style.visibility</p:attrName>
+                                        </p:attrNameLst>
+                                      </p:cBhvr>
+                                      <p:to>
+                                        <p:strVal val="visible"/>
+                                      </p:to>
+                                    </p:set>
+                                    <p:animEffect filter="fade" transition="in">
+                                      <p:cBhvr>
+                                        <p:cTn dur="1"/>
+                                        <p:tgtEl>
+                                          <p:spTgt spid="103">
+                                            <p:txEl>
+                                              <p:pRg end="1" st="1"/>
+                                            </p:txEl>
+                                          </p:spTgt>
+                                        </p:tgtEl>
+                                      </p:cBhvr>
+                                    </p:animEffect>
+                                  </p:childTnLst>
+                                </p:cTn>
+                              </p:par>
+                            </p:childTnLst>
+                          </p:cTn>
+                        </p:par>
+                      </p:childTnLst>
+                    </p:cTn>
+                  </p:par>
+                  <p:par>
+                    <p:cTn fill="hold">
+                      <p:stCondLst>
+                        <p:cond delay="indefinite"/>
+                      </p:stCondLst>
+                      <p:childTnLst>
+                        <p:par>
+                          <p:cTn fill="hold">
+                            <p:stCondLst>
+                              <p:cond delay="0"/>
+                            </p:stCondLst>
+                            <p:childTnLst>
+                              <p:par>
+                                <p:cTn fill="hold" nodeType="clickEffect" presetClass="entr" presetID="10" presetSubtype="0">
+                                  <p:stCondLst>
+                                    <p:cond delay="0"/>
+                                  </p:stCondLst>
+                                  <p:childTnLst>
+                                    <p:set>
+                                      <p:cBhvr>
+                                        <p:cTn dur="1" fill="hold">
+                                          <p:stCondLst>
+                                            <p:cond delay="0"/>
+                                          </p:stCondLst>
+                                        </p:cTn>
+                                        <p:tgtEl>
+                                          <p:spTgt spid="103">
+                                            <p:txEl>
+                                              <p:pRg end="2" st="2"/>
+                                            </p:txEl>
+                                          </p:spTgt>
+                                        </p:tgtEl>
+                                        <p:attrNameLst>
+                                          <p:attrName>style.visibility</p:attrName>
+                                        </p:attrNameLst>
+                                      </p:cBhvr>
+                                      <p:to>
+                                        <p:strVal val="visible"/>
+                                      </p:to>
+                                    </p:set>
+                                    <p:animEffect filter="fade" transition="in">
+                                      <p:cBhvr>
+                                        <p:cTn dur="1"/>
+                                        <p:tgtEl>
+                                          <p:spTgt spid="103">
+                                            <p:txEl>
+                                              <p:pRg end="2" st="2"/>
+                                            </p:txEl>
+                                          </p:spTgt>
+                                        </p:tgtEl>
+                                      </p:cBhvr>
+                                    </p:animEffect>
+                                  </p:childTnLst>
+                                </p:cTn>
+                              </p:par>
+                            </p:childTnLst>
+                          </p:cTn>
+                        </p:par>
+                      </p:childTnLst>
+                    </p:cTn>
+                  </p:par>
                   <p:par>
                     <p:cTn fill="hold">
                       <p:stCondLst>
@@ -5136,6 +5457,204 @@
                       </p:childTnLst>
                     </p:cTn>
                   </p:par>
+                </p:childTnLst>
+              </p:cTn>
+              <p:prevCondLst>
+                <p:cond evt="onPrev">
+                  <p:tgtEl>
+                    <p:sldTgt/>
+                  </p:tgtEl>
+                </p:cond>
+              </p:prevCondLst>
+              <p:nextCondLst>
+                <p:cond evt="onNext">
+                  <p:tgtEl>
+                    <p:sldTgt/>
+                  </p:tgtEl>
+                </p:cond>
+              </p:nextCondLst>
+            </p:seq>
+          </p:childTnLst>
+        </p:cTn>
+      </p:par>
+    </p:tnLst>
+  </p:timing>
+</p:sld>
+</file>
+
+<file path=ppt/slides/slide12.xml><?xml version="1.0" encoding="utf-8"?>
+<p:sld xmlns:a="http://schemas.openxmlformats.org/drawingml/2006/main" xmlns:r="http://schemas.openxmlformats.org/officeDocument/2006/relationships" xmlns:mc="http://schemas.openxmlformats.org/markup-compatibility/2006" xmlns:mv="urn:schemas-microsoft-com:mac:vml" xmlns:p="http://schemas.openxmlformats.org/presentationml/2006/main" xmlns:c="http://schemas.openxmlformats.org/drawingml/2006/chart" xmlns:dgm="http://schemas.openxmlformats.org/drawingml/2006/diagram" xmlns:o="urn:schemas-microsoft-com:office:office" xmlns:v="urn:schemas-microsoft-com:vml" xmlns:pvml="urn:schemas-microsoft-com:office:powerpoint" xmlns:com="http://schemas.openxmlformats.org/drawingml/2006/compatibility" xmlns:p14="http://schemas.microsoft.com/office/powerpoint/2010/main">
+  <p:cSld>
+    <p:spTree>
+      <p:nvGrpSpPr>
+        <p:cNvPr id="107" name="Shape 107"/>
+        <p:cNvGrpSpPr/>
+        <p:nvPr/>
+      </p:nvGrpSpPr>
+      <p:grpSpPr>
+        <a:xfrm>
+          <a:off x="0" y="0"/>
+          <a:ext cx="0" cy="0"/>
+          <a:chOff x="0" y="0"/>
+          <a:chExt cx="0" cy="0"/>
+        </a:xfrm>
+      </p:grpSpPr>
+      <p:sp>
+        <p:nvSpPr>
+          <p:cNvPr id="108" name="Shape 108"/>
+          <p:cNvSpPr txBox="1"/>
+          <p:nvPr>
+            <p:ph type="title"/>
+          </p:nvPr>
+        </p:nvSpPr>
+        <p:spPr>
+          <a:xfrm>
+            <a:off x="457200" y="274637"/>
+            <a:ext cx="8229600" cy="1522199"/>
+          </a:xfrm>
+          <a:prstGeom prst="rect">
+            <a:avLst/>
+          </a:prstGeom>
+        </p:spPr>
+        <p:txBody>
+          <a:bodyPr anchorCtr="0" anchor="b" bIns="91425" lIns="91425" rIns="91425" tIns="91425">
+            <a:noAutofit/>
+          </a:bodyPr>
+          <a:lstStyle/>
+          <a:p>
+            <a:pPr>
+              <a:spcBef>
+                <a:spcPts val="0"/>
+              </a:spcBef>
+              <a:buNone/>
+            </a:pPr>
+            <a:r>
+              <a:rPr lang="en"/>
+              <a:t>Stress Resilience</a:t>
+            </a:r>
+          </a:p>
+        </p:txBody>
+      </p:sp>
+      <p:sp>
+        <p:nvSpPr>
+          <p:cNvPr id="109" name="Shape 109"/>
+          <p:cNvSpPr txBox="1"/>
+          <p:nvPr>
+            <p:ph idx="1" type="body"/>
+          </p:nvPr>
+        </p:nvSpPr>
+        <p:spPr>
+          <a:xfrm>
+            <a:off x="457200" y="1947332"/>
+            <a:ext cx="8229600" cy="4620299"/>
+          </a:xfrm>
+          <a:prstGeom prst="rect">
+            <a:avLst/>
+          </a:prstGeom>
+        </p:spPr>
+        <p:txBody>
+          <a:bodyPr anchorCtr="0" anchor="t" bIns="91425" lIns="91425" rIns="91425" tIns="91425">
+            <a:noAutofit/>
+          </a:bodyPr>
+          <a:lstStyle/>
+          <a:p>
+            <a:pPr indent="-419100" lvl="0" marL="457200" rtl="0">
+              <a:lnSpc>
+                <a:spcPct val="200000"/>
+              </a:lnSpc>
+              <a:spcBef>
+                <a:spcPts val="0"/>
+              </a:spcBef>
+              <a:buClr>
+                <a:schemeClr val="dk2"/>
+              </a:buClr>
+              <a:buSzPct val="100000"/>
+              <a:buFont typeface="Arial"/>
+              <a:buChar char="●"/>
+            </a:pPr>
+            <a:r>
+              <a:rPr lang="en"/>
+              <a:t>What is Stress Resilience?</a:t>
+            </a:r>
+          </a:p>
+          <a:p>
+            <a:pPr indent="-419100" lvl="0" marL="457200" rtl="0">
+              <a:lnSpc>
+                <a:spcPct val="200000"/>
+              </a:lnSpc>
+              <a:spcBef>
+                <a:spcPts val="0"/>
+              </a:spcBef>
+              <a:buClr>
+                <a:schemeClr val="dk2"/>
+              </a:buClr>
+              <a:buSzPct val="100000"/>
+              <a:buFont typeface="Arial"/>
+              <a:buChar char="●"/>
+            </a:pPr>
+            <a:r>
+              <a:rPr lang="en"/>
+              <a:t>How can invertebrates resist stress?</a:t>
+            </a:r>
+          </a:p>
+          <a:p>
+            <a:pPr indent="-419100" lvl="0" marL="457200" rtl="0">
+              <a:lnSpc>
+                <a:spcPct val="200000"/>
+              </a:lnSpc>
+              <a:spcBef>
+                <a:spcPts val="0"/>
+              </a:spcBef>
+              <a:buClr>
+                <a:schemeClr val="dk2"/>
+              </a:buClr>
+              <a:buSzPct val="100000"/>
+              <a:buFont typeface="Arial"/>
+              <a:buChar char="●"/>
+            </a:pPr>
+            <a:r>
+              <a:rPr lang="en"/>
+              <a:t>What happens when they fail?</a:t>
+            </a:r>
+          </a:p>
+          <a:p>
+            <a:pPr indent="-419100" lvl="0" marL="457200">
+              <a:lnSpc>
+                <a:spcPct val="200000"/>
+              </a:lnSpc>
+              <a:spcBef>
+                <a:spcPts val="0"/>
+              </a:spcBef>
+              <a:buClr>
+                <a:schemeClr val="dk2"/>
+              </a:buClr>
+              <a:buSzPct val="100000"/>
+              <a:buFont typeface="Arial"/>
+              <a:buChar char="●"/>
+            </a:pPr>
+            <a:r>
+              <a:rPr lang="en"/>
+              <a:t>How would you test their stress resilience?</a:t>
+            </a:r>
+          </a:p>
+        </p:txBody>
+      </p:sp>
+    </p:spTree>
+  </p:cSld>
+  <p:clrMapOvr>
+    <a:masterClrMapping/>
+  </p:clrMapOvr>
+  <p:transition spd="slow">
+    <p:cut/>
+  </p:transition>
+  <p:timing>
+    <p:tnLst>
+      <p:par>
+        <p:cTn dur="indefinite" nodeType="tmRoot" restart="never">
+          <p:childTnLst>
+            <p:seq concurrent="1" nextAc="seek">
+              <p:cTn dur="indefinite" id="2" nodeType="mainSeq">
+                <p:childTnLst>
                   <p:par>
                     <p:cTn fill="hold">
                       <p:stCondLst>
@@ -5162,7 +5681,190 @@
                                           </p:stCondLst>
                                         </p:cTn>
                                         <p:tgtEl>
-                                          <p:spTgt spid="102">
+                                          <p:spTgt spid="109">
+                                            <p:txEl>
+                                              <p:pRg end="0" st="0"/>
+                                            </p:txEl>
+                                          </p:spTgt>
+                                        </p:tgtEl>
+                                        <p:attrNameLst>
+                                          <p:attrName>style.visibility</p:attrName>
+                                        </p:attrNameLst>
+                                      </p:cBhvr>
+                                      <p:to>
+                                        <p:strVal val="visible"/>
+                                      </p:to>
+                                    </p:set>
+                                    <p:animEffect filter="fade" transition="in">
+                                      <p:cBhvr>
+                                        <p:cTn dur="1"/>
+                                        <p:tgtEl>
+                                          <p:spTgt spid="109">
+                                            <p:txEl>
+                                              <p:pRg end="0" st="0"/>
+                                            </p:txEl>
+                                          </p:spTgt>
+                                        </p:tgtEl>
+                                      </p:cBhvr>
+                                    </p:animEffect>
+                                  </p:childTnLst>
+                                </p:cTn>
+                              </p:par>
+                            </p:childTnLst>
+                          </p:cTn>
+                        </p:par>
+                      </p:childTnLst>
+                    </p:cTn>
+                  </p:par>
+                  <p:par>
+                    <p:cTn fill="hold">
+                      <p:stCondLst>
+                        <p:cond delay="indefinite"/>
+                      </p:stCondLst>
+                      <p:childTnLst>
+                        <p:par>
+                          <p:cTn fill="hold">
+                            <p:stCondLst>
+                              <p:cond delay="0"/>
+                            </p:stCondLst>
+                            <p:childTnLst>
+                              <p:par>
+                                <p:cTn fill="hold" nodeType="clickEffect" presetClass="entr" presetID="10" presetSubtype="0">
+                                  <p:stCondLst>
+                                    <p:cond delay="0"/>
+                                  </p:stCondLst>
+                                  <p:childTnLst>
+                                    <p:set>
+                                      <p:cBhvr>
+                                        <p:cTn dur="1" fill="hold">
+                                          <p:stCondLst>
+                                            <p:cond delay="0"/>
+                                          </p:stCondLst>
+                                        </p:cTn>
+                                        <p:tgtEl>
+                                          <p:spTgt spid="109">
+                                            <p:txEl>
+                                              <p:pRg end="1" st="1"/>
+                                            </p:txEl>
+                                          </p:spTgt>
+                                        </p:tgtEl>
+                                        <p:attrNameLst>
+                                          <p:attrName>style.visibility</p:attrName>
+                                        </p:attrNameLst>
+                                      </p:cBhvr>
+                                      <p:to>
+                                        <p:strVal val="visible"/>
+                                      </p:to>
+                                    </p:set>
+                                    <p:animEffect filter="fade" transition="in">
+                                      <p:cBhvr>
+                                        <p:cTn dur="1"/>
+                                        <p:tgtEl>
+                                          <p:spTgt spid="109">
+                                            <p:txEl>
+                                              <p:pRg end="1" st="1"/>
+                                            </p:txEl>
+                                          </p:spTgt>
+                                        </p:tgtEl>
+                                      </p:cBhvr>
+                                    </p:animEffect>
+                                  </p:childTnLst>
+                                </p:cTn>
+                              </p:par>
+                            </p:childTnLst>
+                          </p:cTn>
+                        </p:par>
+                      </p:childTnLst>
+                    </p:cTn>
+                  </p:par>
+                  <p:par>
+                    <p:cTn fill="hold">
+                      <p:stCondLst>
+                        <p:cond delay="indefinite"/>
+                      </p:stCondLst>
+                      <p:childTnLst>
+                        <p:par>
+                          <p:cTn fill="hold">
+                            <p:stCondLst>
+                              <p:cond delay="0"/>
+                            </p:stCondLst>
+                            <p:childTnLst>
+                              <p:par>
+                                <p:cTn fill="hold" nodeType="clickEffect" presetClass="entr" presetID="10" presetSubtype="0">
+                                  <p:stCondLst>
+                                    <p:cond delay="0"/>
+                                  </p:stCondLst>
+                                  <p:childTnLst>
+                                    <p:set>
+                                      <p:cBhvr>
+                                        <p:cTn dur="1" fill="hold">
+                                          <p:stCondLst>
+                                            <p:cond delay="0"/>
+                                          </p:stCondLst>
+                                        </p:cTn>
+                                        <p:tgtEl>
+                                          <p:spTgt spid="109">
+                                            <p:txEl>
+                                              <p:pRg end="2" st="2"/>
+                                            </p:txEl>
+                                          </p:spTgt>
+                                        </p:tgtEl>
+                                        <p:attrNameLst>
+                                          <p:attrName>style.visibility</p:attrName>
+                                        </p:attrNameLst>
+                                      </p:cBhvr>
+                                      <p:to>
+                                        <p:strVal val="visible"/>
+                                      </p:to>
+                                    </p:set>
+                                    <p:animEffect filter="fade" transition="in">
+                                      <p:cBhvr>
+                                        <p:cTn dur="1"/>
+                                        <p:tgtEl>
+                                          <p:spTgt spid="109">
+                                            <p:txEl>
+                                              <p:pRg end="2" st="2"/>
+                                            </p:txEl>
+                                          </p:spTgt>
+                                        </p:tgtEl>
+                                      </p:cBhvr>
+                                    </p:animEffect>
+                                  </p:childTnLst>
+                                </p:cTn>
+                              </p:par>
+                            </p:childTnLst>
+                          </p:cTn>
+                        </p:par>
+                      </p:childTnLst>
+                    </p:cTn>
+                  </p:par>
+                  <p:par>
+                    <p:cTn fill="hold">
+                      <p:stCondLst>
+                        <p:cond delay="indefinite"/>
+                      </p:stCondLst>
+                      <p:childTnLst>
+                        <p:par>
+                          <p:cTn fill="hold">
+                            <p:stCondLst>
+                              <p:cond delay="0"/>
+                            </p:stCondLst>
+                            <p:childTnLst>
+                              <p:par>
+                                <p:cTn fill="hold" nodeType="clickEffect" presetClass="entr" presetID="10" presetSubtype="0">
+                                  <p:stCondLst>
+                                    <p:cond delay="0"/>
+                                  </p:stCondLst>
+                                  <p:childTnLst>
+                                    <p:set>
+                                      <p:cBhvr>
+                                        <p:cTn dur="1" fill="hold">
+                                          <p:stCondLst>
+                                            <p:cond delay="0"/>
+                                          </p:stCondLst>
+                                        </p:cTn>
+                                        <p:tgtEl>
+                                          <p:spTgt spid="109">
                                             <p:txEl>
                                               <p:pRg end="3" st="3"/>
                                             </p:txEl>
@@ -5180,7 +5882,7 @@
                                       <p:cBhvr>
                                         <p:cTn dur="1"/>
                                         <p:tgtEl>
-                                          <p:spTgt spid="102">
+                                          <p:spTgt spid="109">
                                             <p:txEl>
                                               <p:pRg end="3" st="3"/>
                                             </p:txEl>
@@ -5222,12 +5924,12 @@
 </p:sld>
 </file>
 
-<file path=ppt/slides/slide12.xml><?xml version="1.0" encoding="utf-8"?>
+<file path=ppt/slides/slide13.xml><?xml version="1.0" encoding="utf-8"?>
 <p:sld xmlns:a="http://schemas.openxmlformats.org/drawingml/2006/main" xmlns:r="http://schemas.openxmlformats.org/officeDocument/2006/relationships" xmlns:mc="http://schemas.openxmlformats.org/markup-compatibility/2006" xmlns:mv="urn:schemas-microsoft-com:mac:vml" xmlns:p="http://schemas.openxmlformats.org/presentationml/2006/main" xmlns:c="http://schemas.openxmlformats.org/drawingml/2006/chart" xmlns:dgm="http://schemas.openxmlformats.org/drawingml/2006/diagram" xmlns:o="urn:schemas-microsoft-com:office:office" xmlns:v="urn:schemas-microsoft-com:vml" xmlns:pvml="urn:schemas-microsoft-com:office:powerpoint" xmlns:com="http://schemas.openxmlformats.org/drawingml/2006/compatibility" xmlns:p14="http://schemas.microsoft.com/office/powerpoint/2010/main">
   <p:cSld>
     <p:spTree>
       <p:nvGrpSpPr>
-        <p:cNvPr id="106" name="Shape 106"/>
+        <p:cNvPr id="113" name="Shape 113"/>
         <p:cNvGrpSpPr/>
         <p:nvPr/>
       </p:nvGrpSpPr>
@@ -5241,7 +5943,7 @@
       </p:grpSpPr>
       <p:sp>
         <p:nvSpPr>
-          <p:cNvPr id="107" name="Shape 107"/>
+          <p:cNvPr id="114" name="Shape 114"/>
           <p:cNvSpPr txBox="1"/>
           <p:nvPr>
             <p:ph type="title"/>
@@ -5277,7 +5979,7 @@
       </p:sp>
       <p:sp>
         <p:nvSpPr>
-          <p:cNvPr id="108" name="Shape 108"/>
+          <p:cNvPr id="115" name="Shape 115"/>
           <p:cNvSpPr txBox="1"/>
           <p:nvPr>
             <p:ph idx="1" type="body"/>
@@ -5313,7 +6015,7 @@
       </p:sp>
       <p:pic>
         <p:nvPicPr>
-          <p:cNvPr id="109" name="Shape 109"/>
+          <p:cNvPr id="116" name="Shape 116"/>
           <p:cNvPicPr preferRelativeResize="0"/>
           <p:nvPr/>
         </p:nvPicPr>
@@ -5341,7 +6043,7 @@
       </p:pic>
       <p:pic>
         <p:nvPicPr>
-          <p:cNvPr id="110" name="Shape 110"/>
+          <p:cNvPr id="117" name="Shape 117"/>
           <p:cNvPicPr preferRelativeResize="0"/>
           <p:nvPr/>
         </p:nvPicPr>
@@ -5369,7 +6071,7 @@
       </p:pic>
       <p:pic>
         <p:nvPicPr>
-          <p:cNvPr id="111" name="Shape 111"/>
+          <p:cNvPr id="118" name="Shape 118"/>
           <p:cNvPicPr preferRelativeResize="0"/>
           <p:nvPr/>
         </p:nvPicPr>
@@ -5397,7 +6099,7 @@
       </p:pic>
       <p:pic>
         <p:nvPicPr>
-          <p:cNvPr id="112" name="Shape 112"/>
+          <p:cNvPr id="119" name="Shape 119"/>
           <p:cNvPicPr preferRelativeResize="0"/>
           <p:nvPr/>
         </p:nvPicPr>
@@ -5425,7 +6127,7 @@
       </p:pic>
       <p:pic>
         <p:nvPicPr>
-          <p:cNvPr id="113" name="Shape 113"/>
+          <p:cNvPr id="120" name="Shape 120"/>
           <p:cNvPicPr preferRelativeResize="0"/>
           <p:nvPr/>
         </p:nvPicPr>
@@ -5453,7 +6155,7 @@
       </p:pic>
       <p:pic>
         <p:nvPicPr>
-          <p:cNvPr id="114" name="Shape 114"/>
+          <p:cNvPr id="121" name="Shape 121"/>
           <p:cNvPicPr preferRelativeResize="0"/>
           <p:nvPr/>
         </p:nvPicPr>
@@ -5481,7 +6183,7 @@
       </p:pic>
       <p:pic>
         <p:nvPicPr>
-          <p:cNvPr id="115" name="Shape 115"/>
+          <p:cNvPr id="122" name="Shape 122"/>
           <p:cNvPicPr preferRelativeResize="0"/>
           <p:nvPr/>
         </p:nvPicPr>
@@ -5509,7 +6211,7 @@
       </p:pic>
       <p:pic>
         <p:nvPicPr>
-          <p:cNvPr id="116" name="Shape 116"/>
+          <p:cNvPr id="123" name="Shape 123"/>
           <p:cNvPicPr preferRelativeResize="0"/>
           <p:nvPr/>
         </p:nvPicPr>
@@ -5537,7 +6239,7 @@
       </p:pic>
       <p:pic>
         <p:nvPicPr>
-          <p:cNvPr id="117" name="Shape 117"/>
+          <p:cNvPr id="124" name="Shape 124"/>
           <p:cNvPicPr preferRelativeResize="0"/>
           <p:nvPr/>
         </p:nvPicPr>
@@ -5565,7 +6267,7 @@
       </p:pic>
       <p:pic>
         <p:nvPicPr>
-          <p:cNvPr id="118" name="Shape 118"/>
+          <p:cNvPr id="125" name="Shape 125"/>
           <p:cNvPicPr preferRelativeResize="0"/>
           <p:nvPr/>
         </p:nvPicPr>
@@ -5593,7 +6295,7 @@
       </p:pic>
       <p:pic>
         <p:nvPicPr>
-          <p:cNvPr id="119" name="Shape 119"/>
+          <p:cNvPr id="126" name="Shape 126"/>
           <p:cNvPicPr preferRelativeResize="0"/>
           <p:nvPr/>
         </p:nvPicPr>
@@ -5621,7 +6323,7 @@
       </p:pic>
       <p:pic>
         <p:nvPicPr>
-          <p:cNvPr id="120" name="Shape 120"/>
+          <p:cNvPr id="127" name="Shape 127"/>
           <p:cNvPicPr preferRelativeResize="0"/>
           <p:nvPr/>
         </p:nvPicPr>
@@ -5649,7 +6351,7 @@
       </p:pic>
       <p:pic>
         <p:nvPicPr>
-          <p:cNvPr id="121" name="Shape 121"/>
+          <p:cNvPr id="128" name="Shape 128"/>
           <p:cNvPicPr preferRelativeResize="0"/>
           <p:nvPr/>
         </p:nvPicPr>
@@ -5677,7 +6379,7 @@
       </p:pic>
       <p:pic>
         <p:nvPicPr>
-          <p:cNvPr id="122" name="Shape 122"/>
+          <p:cNvPr id="129" name="Shape 129"/>
           <p:cNvPicPr preferRelativeResize="0"/>
           <p:nvPr/>
         </p:nvPicPr>
@@ -5705,7 +6407,7 @@
       </p:pic>
       <p:pic>
         <p:nvPicPr>
-          <p:cNvPr id="123" name="Shape 123"/>
+          <p:cNvPr id="130" name="Shape 130"/>
           <p:cNvPicPr preferRelativeResize="0"/>
           <p:nvPr/>
         </p:nvPicPr>
@@ -5733,7 +6435,7 @@
       </p:pic>
       <p:pic>
         <p:nvPicPr>
-          <p:cNvPr id="124" name="Shape 124"/>
+          <p:cNvPr id="131" name="Shape 131"/>
           <p:cNvPicPr preferRelativeResize="0"/>
           <p:nvPr/>
         </p:nvPicPr>
@@ -5760,7 +6462,7 @@
       </p:pic>
       <p:grpSp>
         <p:nvGrpSpPr>
-          <p:cNvPr id="125" name="Shape 125"/>
+          <p:cNvPr id="132" name="Shape 132"/>
           <p:cNvGrpSpPr/>
           <p:nvPr/>
         </p:nvGrpSpPr>
@@ -5774,7 +6476,7 @@
         </p:grpSpPr>
         <p:pic>
           <p:nvPicPr>
-            <p:cNvPr id="126" name="Shape 126"/>
+            <p:cNvPr id="133" name="Shape 133"/>
             <p:cNvPicPr preferRelativeResize="0"/>
             <p:nvPr/>
           </p:nvPicPr>
@@ -5801,7 +6503,7 @@
         </p:pic>
         <p:sp>
           <p:nvSpPr>
-            <p:cNvPr id="127" name="Shape 127"/>
+            <p:cNvPr id="134" name="Shape 134"/>
             <p:cNvSpPr/>
             <p:nvPr/>
           </p:nvSpPr>
@@ -5891,7 +6593,7 @@
                                           </p:stCondLst>
                                         </p:cTn>
                                         <p:tgtEl>
-                                          <p:spTgt spid="109"/>
+                                          <p:spTgt spid="116"/>
                                         </p:tgtEl>
                                         <p:attrNameLst>
                                           <p:attrName>style.visibility</p:attrName>
@@ -5905,7 +6607,7 @@
                                       <p:cBhvr>
                                         <p:cTn dur="1"/>
                                         <p:tgtEl>
-                                          <p:spTgt spid="109"/>
+                                          <p:spTgt spid="116"/>
                                         </p:tgtEl>
                                       </p:cBhvr>
                                     </p:animEffect>
@@ -5926,7 +6628,7 @@
                                           </p:stCondLst>
                                         </p:cTn>
                                         <p:tgtEl>
-                                          <p:spTgt spid="114"/>
+                                          <p:spTgt spid="121"/>
                                         </p:tgtEl>
                                         <p:attrNameLst>
                                           <p:attrName>style.visibility</p:attrName>
@@ -5940,7 +6642,7 @@
                                       <p:cBhvr>
                                         <p:cTn dur="1"/>
                                         <p:tgtEl>
-                                          <p:spTgt spid="114"/>
+                                          <p:spTgt spid="121"/>
                                         </p:tgtEl>
                                       </p:cBhvr>
                                     </p:animEffect>
@@ -5961,7 +6663,7 @@
                                           </p:stCondLst>
                                         </p:cTn>
                                         <p:tgtEl>
-                                          <p:spTgt spid="113"/>
+                                          <p:spTgt spid="120"/>
                                         </p:tgtEl>
                                         <p:attrNameLst>
                                           <p:attrName>style.visibility</p:attrName>
@@ -5975,7 +6677,7 @@
                                       <p:cBhvr>
                                         <p:cTn dur="1"/>
                                         <p:tgtEl>
-                                          <p:spTgt spid="113"/>
+                                          <p:spTgt spid="120"/>
                                         </p:tgtEl>
                                       </p:cBhvr>
                                     </p:animEffect>
@@ -5993,6 +6695,235 @@
                             <p:childTnLst>
                               <p:par>
                                 <p:cTn fill="hold" nodeType="afterEffect" presetClass="entr" presetID="10" presetSubtype="0">
+                                  <p:stCondLst>
+                                    <p:cond delay="0"/>
+                                  </p:stCondLst>
+                                  <p:childTnLst>
+                                    <p:set>
+                                      <p:cBhvr>
+                                        <p:cTn dur="1" fill="hold">
+                                          <p:stCondLst>
+                                            <p:cond delay="0"/>
+                                          </p:stCondLst>
+                                        </p:cTn>
+                                        <p:tgtEl>
+                                          <p:spTgt spid="129"/>
+                                        </p:tgtEl>
+                                        <p:attrNameLst>
+                                          <p:attrName>style.visibility</p:attrName>
+                                        </p:attrNameLst>
+                                      </p:cBhvr>
+                                      <p:to>
+                                        <p:strVal val="visible"/>
+                                      </p:to>
+                                    </p:set>
+                                    <p:animEffect filter="fade" transition="in">
+                                      <p:cBhvr>
+                                        <p:cTn dur="1"/>
+                                        <p:tgtEl>
+                                          <p:spTgt spid="129"/>
+                                        </p:tgtEl>
+                                      </p:cBhvr>
+                                    </p:animEffect>
+                                  </p:childTnLst>
+                                </p:cTn>
+                              </p:par>
+                              <p:par>
+                                <p:cTn fill="hold" nodeType="withEffect" presetClass="entr" presetID="10" presetSubtype="0">
+                                  <p:stCondLst>
+                                    <p:cond delay="0"/>
+                                  </p:stCondLst>
+                                  <p:childTnLst>
+                                    <p:set>
+                                      <p:cBhvr>
+                                        <p:cTn dur="1" fill="hold">
+                                          <p:stCondLst>
+                                            <p:cond delay="0"/>
+                                          </p:stCondLst>
+                                        </p:cTn>
+                                        <p:tgtEl>
+                                          <p:spTgt spid="130"/>
+                                        </p:tgtEl>
+                                        <p:attrNameLst>
+                                          <p:attrName>style.visibility</p:attrName>
+                                        </p:attrNameLst>
+                                      </p:cBhvr>
+                                      <p:to>
+                                        <p:strVal val="visible"/>
+                                      </p:to>
+                                    </p:set>
+                                    <p:animEffect filter="fade" transition="in">
+                                      <p:cBhvr>
+                                        <p:cTn dur="1"/>
+                                        <p:tgtEl>
+                                          <p:spTgt spid="130"/>
+                                        </p:tgtEl>
+                                      </p:cBhvr>
+                                    </p:animEffect>
+                                  </p:childTnLst>
+                                </p:cTn>
+                              </p:par>
+                            </p:childTnLst>
+                          </p:cTn>
+                        </p:par>
+                      </p:childTnLst>
+                    </p:cTn>
+                  </p:par>
+                  <p:par>
+                    <p:cTn fill="hold">
+                      <p:stCondLst>
+                        <p:cond delay="indefinite"/>
+                      </p:stCondLst>
+                      <p:childTnLst>
+                        <p:par>
+                          <p:cTn fill="hold">
+                            <p:stCondLst>
+                              <p:cond delay="0"/>
+                            </p:stCondLst>
+                            <p:childTnLst>
+                              <p:par>
+                                <p:cTn fill="hold" nodeType="clickEffect" presetClass="entr" presetID="10" presetSubtype="0">
+                                  <p:stCondLst>
+                                    <p:cond delay="0"/>
+                                  </p:stCondLst>
+                                  <p:childTnLst>
+                                    <p:set>
+                                      <p:cBhvr>
+                                        <p:cTn dur="1" fill="hold">
+                                          <p:stCondLst>
+                                            <p:cond delay="0"/>
+                                          </p:stCondLst>
+                                        </p:cTn>
+                                        <p:tgtEl>
+                                          <p:spTgt spid="117"/>
+                                        </p:tgtEl>
+                                        <p:attrNameLst>
+                                          <p:attrName>style.visibility</p:attrName>
+                                        </p:attrNameLst>
+                                      </p:cBhvr>
+                                      <p:to>
+                                        <p:strVal val="visible"/>
+                                      </p:to>
+                                    </p:set>
+                                    <p:animEffect filter="fade" transition="in">
+                                      <p:cBhvr>
+                                        <p:cTn dur="1400"/>
+                                        <p:tgtEl>
+                                          <p:spTgt spid="117"/>
+                                        </p:tgtEl>
+                                      </p:cBhvr>
+                                    </p:animEffect>
+                                  </p:childTnLst>
+                                </p:cTn>
+                              </p:par>
+                            </p:childTnLst>
+                          </p:cTn>
+                        </p:par>
+                        <p:par>
+                          <p:cTn fill="hold">
+                            <p:stCondLst>
+                              <p:cond delay="1400"/>
+                            </p:stCondLst>
+                            <p:childTnLst>
+                              <p:par>
+                                <p:cTn fill="hold" nodeType="afterEffect" presetClass="entr" presetID="10" presetSubtype="0">
+                                  <p:stCondLst>
+                                    <p:cond delay="0"/>
+                                  </p:stCondLst>
+                                  <p:childTnLst>
+                                    <p:set>
+                                      <p:cBhvr>
+                                        <p:cTn dur="1" fill="hold">
+                                          <p:stCondLst>
+                                            <p:cond delay="0"/>
+                                          </p:stCondLst>
+                                        </p:cTn>
+                                        <p:tgtEl>
+                                          <p:spTgt spid="118"/>
+                                        </p:tgtEl>
+                                        <p:attrNameLst>
+                                          <p:attrName>style.visibility</p:attrName>
+                                        </p:attrNameLst>
+                                      </p:cBhvr>
+                                      <p:to>
+                                        <p:strVal val="visible"/>
+                                      </p:to>
+                                    </p:set>
+                                    <p:animEffect filter="fade" transition="in">
+                                      <p:cBhvr>
+                                        <p:cTn dur="2500"/>
+                                        <p:tgtEl>
+                                          <p:spTgt spid="118"/>
+                                        </p:tgtEl>
+                                      </p:cBhvr>
+                                    </p:animEffect>
+                                  </p:childTnLst>
+                                </p:cTn>
+                              </p:par>
+                            </p:childTnLst>
+                          </p:cTn>
+                        </p:par>
+                        <p:par>
+                          <p:cTn fill="hold">
+                            <p:stCondLst>
+                              <p:cond delay="3900"/>
+                            </p:stCondLst>
+                            <p:childTnLst>
+                              <p:par>
+                                <p:cTn fill="hold" nodeType="afterEffect" presetClass="entr" presetID="10" presetSubtype="0">
+                                  <p:stCondLst>
+                                    <p:cond delay="0"/>
+                                  </p:stCondLst>
+                                  <p:childTnLst>
+                                    <p:set>
+                                      <p:cBhvr>
+                                        <p:cTn dur="1" fill="hold">
+                                          <p:stCondLst>
+                                            <p:cond delay="0"/>
+                                          </p:stCondLst>
+                                        </p:cTn>
+                                        <p:tgtEl>
+                                          <p:spTgt spid="131"/>
+                                        </p:tgtEl>
+                                        <p:attrNameLst>
+                                          <p:attrName>style.visibility</p:attrName>
+                                        </p:attrNameLst>
+                                      </p:cBhvr>
+                                      <p:to>
+                                        <p:strVal val="visible"/>
+                                      </p:to>
+                                    </p:set>
+                                    <p:animEffect filter="fade" transition="in">
+                                      <p:cBhvr>
+                                        <p:cTn dur="1"/>
+                                        <p:tgtEl>
+                                          <p:spTgt spid="131"/>
+                                        </p:tgtEl>
+                                      </p:cBhvr>
+                                    </p:animEffect>
+                                  </p:childTnLst>
+                                </p:cTn>
+                              </p:par>
+                            </p:childTnLst>
+                          </p:cTn>
+                        </p:par>
+                      </p:childTnLst>
+                    </p:cTn>
+                  </p:par>
+                  <p:par>
+                    <p:cTn fill="hold">
+                      <p:stCondLst>
+                        <p:cond delay="indefinite"/>
+                      </p:stCondLst>
+                      <p:childTnLst>
+                        <p:par>
+                          <p:cTn fill="hold">
+                            <p:stCondLst>
+                              <p:cond delay="0"/>
+                            </p:stCondLst>
+                            <p:childTnLst>
+                              <p:par>
+                                <p:cTn fill="hold" nodeType="clickEffect" presetClass="entr" presetID="10" presetSubtype="0">
                                   <p:stCondLst>
                                     <p:cond delay="0"/>
                                   </p:stCondLst>
@@ -6052,7 +6983,7 @@
                                     </p:set>
                                     <p:animEffect filter="fade" transition="in">
                                       <p:cBhvr>
-                                        <p:cTn dur="1"/>
+                                        <p:cTn dur="1000"/>
                                         <p:tgtEl>
                                           <p:spTgt spid="123"/>
                                         </p:tgtEl>
@@ -6061,114 +6992,8 @@
                                   </p:childTnLst>
                                 </p:cTn>
                               </p:par>
-                            </p:childTnLst>
-                          </p:cTn>
-                        </p:par>
-                      </p:childTnLst>
-                    </p:cTn>
-                  </p:par>
-                  <p:par>
-                    <p:cTn fill="hold">
-                      <p:stCondLst>
-                        <p:cond delay="indefinite"/>
-                      </p:stCondLst>
-                      <p:childTnLst>
-                        <p:par>
-                          <p:cTn fill="hold">
-                            <p:stCondLst>
-                              <p:cond delay="0"/>
-                            </p:stCondLst>
-                            <p:childTnLst>
                               <p:par>
-                                <p:cTn fill="hold" nodeType="clickEffect" presetClass="entr" presetID="10" presetSubtype="0">
-                                  <p:stCondLst>
-                                    <p:cond delay="0"/>
-                                  </p:stCondLst>
-                                  <p:childTnLst>
-                                    <p:set>
-                                      <p:cBhvr>
-                                        <p:cTn dur="1" fill="hold">
-                                          <p:stCondLst>
-                                            <p:cond delay="0"/>
-                                          </p:stCondLst>
-                                        </p:cTn>
-                                        <p:tgtEl>
-                                          <p:spTgt spid="110"/>
-                                        </p:tgtEl>
-                                        <p:attrNameLst>
-                                          <p:attrName>style.visibility</p:attrName>
-                                        </p:attrNameLst>
-                                      </p:cBhvr>
-                                      <p:to>
-                                        <p:strVal val="visible"/>
-                                      </p:to>
-                                    </p:set>
-                                    <p:animEffect filter="fade" transition="in">
-                                      <p:cBhvr>
-                                        <p:cTn dur="1400"/>
-                                        <p:tgtEl>
-                                          <p:spTgt spid="110"/>
-                                        </p:tgtEl>
-                                      </p:cBhvr>
-                                    </p:animEffect>
-                                  </p:childTnLst>
-                                </p:cTn>
-                              </p:par>
-                            </p:childTnLst>
-                          </p:cTn>
-                        </p:par>
-                        <p:par>
-                          <p:cTn fill="hold">
-                            <p:stCondLst>
-                              <p:cond delay="1400"/>
-                            </p:stCondLst>
-                            <p:childTnLst>
-                              <p:par>
-                                <p:cTn fill="hold" nodeType="afterEffect" presetClass="entr" presetID="10" presetSubtype="0">
-                                  <p:stCondLst>
-                                    <p:cond delay="0"/>
-                                  </p:stCondLst>
-                                  <p:childTnLst>
-                                    <p:set>
-                                      <p:cBhvr>
-                                        <p:cTn dur="1" fill="hold">
-                                          <p:stCondLst>
-                                            <p:cond delay="0"/>
-                                          </p:stCondLst>
-                                        </p:cTn>
-                                        <p:tgtEl>
-                                          <p:spTgt spid="111"/>
-                                        </p:tgtEl>
-                                        <p:attrNameLst>
-                                          <p:attrName>style.visibility</p:attrName>
-                                        </p:attrNameLst>
-                                      </p:cBhvr>
-                                      <p:to>
-                                        <p:strVal val="visible"/>
-                                      </p:to>
-                                    </p:set>
-                                    <p:animEffect filter="fade" transition="in">
-                                      <p:cBhvr>
-                                        <p:cTn dur="2500"/>
-                                        <p:tgtEl>
-                                          <p:spTgt spid="111"/>
-                                        </p:tgtEl>
-                                      </p:cBhvr>
-                                    </p:animEffect>
-                                  </p:childTnLst>
-                                </p:cTn>
-                              </p:par>
-                            </p:childTnLst>
-                          </p:cTn>
-                        </p:par>
-                        <p:par>
-                          <p:cTn fill="hold">
-                            <p:stCondLst>
-                              <p:cond delay="3900"/>
-                            </p:stCondLst>
-                            <p:childTnLst>
-                              <p:par>
-                                <p:cTn fill="hold" nodeType="afterEffect" presetClass="entr" presetID="10" presetSubtype="0">
+                                <p:cTn fill="hold" nodeType="withEffect" presetClass="entr" presetID="10" presetSubtype="0">
                                   <p:stCondLst>
                                     <p:cond delay="0"/>
                                   </p:stCondLst>
@@ -6193,220 +7018,9 @@
                                     </p:set>
                                     <p:animEffect filter="fade" transition="in">
                                       <p:cBhvr>
-                                        <p:cTn dur="1"/>
+                                        <p:cTn dur="1000"/>
                                         <p:tgtEl>
                                           <p:spTgt spid="124"/>
-                                        </p:tgtEl>
-                                      </p:cBhvr>
-                                    </p:animEffect>
-                                  </p:childTnLst>
-                                </p:cTn>
-                              </p:par>
-                            </p:childTnLst>
-                          </p:cTn>
-                        </p:par>
-                      </p:childTnLst>
-                    </p:cTn>
-                  </p:par>
-                  <p:par>
-                    <p:cTn fill="hold">
-                      <p:stCondLst>
-                        <p:cond delay="indefinite"/>
-                      </p:stCondLst>
-                      <p:childTnLst>
-                        <p:par>
-                          <p:cTn fill="hold">
-                            <p:stCondLst>
-                              <p:cond delay="0"/>
-                            </p:stCondLst>
-                            <p:childTnLst>
-                              <p:par>
-                                <p:cTn fill="hold" nodeType="clickEffect" presetClass="entr" presetID="10" presetSubtype="0">
-                                  <p:stCondLst>
-                                    <p:cond delay="0"/>
-                                  </p:stCondLst>
-                                  <p:childTnLst>
-                                    <p:set>
-                                      <p:cBhvr>
-                                        <p:cTn dur="1" fill="hold">
-                                          <p:stCondLst>
-                                            <p:cond delay="0"/>
-                                          </p:stCondLst>
-                                        </p:cTn>
-                                        <p:tgtEl>
-                                          <p:spTgt spid="115"/>
-                                        </p:tgtEl>
-                                        <p:attrNameLst>
-                                          <p:attrName>style.visibility</p:attrName>
-                                        </p:attrNameLst>
-                                      </p:cBhvr>
-                                      <p:to>
-                                        <p:strVal val="visible"/>
-                                      </p:to>
-                                    </p:set>
-                                    <p:animEffect filter="fade" transition="in">
-                                      <p:cBhvr>
-                                        <p:cTn dur="1"/>
-                                        <p:tgtEl>
-                                          <p:spTgt spid="115"/>
-                                        </p:tgtEl>
-                                      </p:cBhvr>
-                                    </p:animEffect>
-                                  </p:childTnLst>
-                                </p:cTn>
-                              </p:par>
-                              <p:par>
-                                <p:cTn fill="hold" nodeType="withEffect" presetClass="entr" presetID="10" presetSubtype="0">
-                                  <p:stCondLst>
-                                    <p:cond delay="0"/>
-                                  </p:stCondLst>
-                                  <p:childTnLst>
-                                    <p:set>
-                                      <p:cBhvr>
-                                        <p:cTn dur="1" fill="hold">
-                                          <p:stCondLst>
-                                            <p:cond delay="0"/>
-                                          </p:stCondLst>
-                                        </p:cTn>
-                                        <p:tgtEl>
-                                          <p:spTgt spid="116"/>
-                                        </p:tgtEl>
-                                        <p:attrNameLst>
-                                          <p:attrName>style.visibility</p:attrName>
-                                        </p:attrNameLst>
-                                      </p:cBhvr>
-                                      <p:to>
-                                        <p:strVal val="visible"/>
-                                      </p:to>
-                                    </p:set>
-                                    <p:animEffect filter="fade" transition="in">
-                                      <p:cBhvr>
-                                        <p:cTn dur="1000"/>
-                                        <p:tgtEl>
-                                          <p:spTgt spid="116"/>
-                                        </p:tgtEl>
-                                      </p:cBhvr>
-                                    </p:animEffect>
-                                  </p:childTnLst>
-                                </p:cTn>
-                              </p:par>
-                              <p:par>
-                                <p:cTn fill="hold" nodeType="withEffect" presetClass="entr" presetID="10" presetSubtype="0">
-                                  <p:stCondLst>
-                                    <p:cond delay="0"/>
-                                  </p:stCondLst>
-                                  <p:childTnLst>
-                                    <p:set>
-                                      <p:cBhvr>
-                                        <p:cTn dur="1" fill="hold">
-                                          <p:stCondLst>
-                                            <p:cond delay="0"/>
-                                          </p:stCondLst>
-                                        </p:cTn>
-                                        <p:tgtEl>
-                                          <p:spTgt spid="117"/>
-                                        </p:tgtEl>
-                                        <p:attrNameLst>
-                                          <p:attrName>style.visibility</p:attrName>
-                                        </p:attrNameLst>
-                                      </p:cBhvr>
-                                      <p:to>
-                                        <p:strVal val="visible"/>
-                                      </p:to>
-                                    </p:set>
-                                    <p:animEffect filter="fade" transition="in">
-                                      <p:cBhvr>
-                                        <p:cTn dur="1000"/>
-                                        <p:tgtEl>
-                                          <p:spTgt spid="117"/>
-                                        </p:tgtEl>
-                                      </p:cBhvr>
-                                    </p:animEffect>
-                                  </p:childTnLst>
-                                </p:cTn>
-                              </p:par>
-                              <p:par>
-                                <p:cTn fill="hold" nodeType="withEffect" presetClass="entr" presetID="10" presetSubtype="0">
-                                  <p:stCondLst>
-                                    <p:cond delay="0"/>
-                                  </p:stCondLst>
-                                  <p:childTnLst>
-                                    <p:set>
-                                      <p:cBhvr>
-                                        <p:cTn dur="1" fill="hold">
-                                          <p:stCondLst>
-                                            <p:cond delay="0"/>
-                                          </p:stCondLst>
-                                        </p:cTn>
-                                        <p:tgtEl>
-                                          <p:spTgt spid="112"/>
-                                        </p:tgtEl>
-                                        <p:attrNameLst>
-                                          <p:attrName>style.visibility</p:attrName>
-                                        </p:attrNameLst>
-                                      </p:cBhvr>
-                                      <p:to>
-                                        <p:strVal val="visible"/>
-                                      </p:to>
-                                    </p:set>
-                                    <p:animEffect filter="fade" transition="in">
-                                      <p:cBhvr>
-                                        <p:cTn dur="1000"/>
-                                        <p:tgtEl>
-                                          <p:spTgt spid="112"/>
-                                        </p:tgtEl>
-                                      </p:cBhvr>
-                                    </p:animEffect>
-                                  </p:childTnLst>
-                                </p:cTn>
-                              </p:par>
-                            </p:childTnLst>
-                          </p:cTn>
-                        </p:par>
-                      </p:childTnLst>
-                    </p:cTn>
-                  </p:par>
-                  <p:par>
-                    <p:cTn fill="hold">
-                      <p:stCondLst>
-                        <p:cond delay="indefinite"/>
-                      </p:stCondLst>
-                      <p:childTnLst>
-                        <p:par>
-                          <p:cTn fill="hold">
-                            <p:stCondLst>
-                              <p:cond delay="0"/>
-                            </p:stCondLst>
-                            <p:childTnLst>
-                              <p:par>
-                                <p:cTn fill="hold" nodeType="clickEffect" presetClass="entr" presetID="10" presetSubtype="0">
-                                  <p:stCondLst>
-                                    <p:cond delay="0"/>
-                                  </p:stCondLst>
-                                  <p:childTnLst>
-                                    <p:set>
-                                      <p:cBhvr>
-                                        <p:cTn dur="1" fill="hold">
-                                          <p:stCondLst>
-                                            <p:cond delay="0"/>
-                                          </p:stCondLst>
-                                        </p:cTn>
-                                        <p:tgtEl>
-                                          <p:spTgt spid="118"/>
-                                        </p:tgtEl>
-                                        <p:attrNameLst>
-                                          <p:attrName>style.visibility</p:attrName>
-                                        </p:attrNameLst>
-                                      </p:cBhvr>
-                                      <p:to>
-                                        <p:strVal val="visible"/>
-                                      </p:to>
-                                    </p:set>
-                                    <p:animEffect filter="fade" transition="in">
-                                      <p:cBhvr>
-                                        <p:cTn dur="1300"/>
-                                        <p:tgtEl>
-                                          <p:spTgt spid="118"/>
                                         </p:tgtEl>
                                       </p:cBhvr>
                                     </p:animEffect>
@@ -6448,8 +7062,26 @@
                                   </p:childTnLst>
                                 </p:cTn>
                               </p:par>
+                            </p:childTnLst>
+                          </p:cTn>
+                        </p:par>
+                      </p:childTnLst>
+                    </p:cTn>
+                  </p:par>
+                  <p:par>
+                    <p:cTn fill="hold">
+                      <p:stCondLst>
+                        <p:cond delay="indefinite"/>
+                      </p:stCondLst>
+                      <p:childTnLst>
+                        <p:par>
+                          <p:cTn fill="hold">
+                            <p:stCondLst>
+                              <p:cond delay="0"/>
+                            </p:stCondLst>
+                            <p:childTnLst>
                               <p:par>
-                                <p:cTn fill="hold" nodeType="withEffect" presetClass="entr" presetID="10" presetSubtype="0">
+                                <p:cTn fill="hold" nodeType="clickEffect" presetClass="entr" presetID="10" presetSubtype="0">
                                   <p:stCondLst>
                                     <p:cond delay="0"/>
                                   </p:stCondLst>
@@ -6462,7 +7094,7 @@
                                           </p:stCondLst>
                                         </p:cTn>
                                         <p:tgtEl>
-                                          <p:spTgt spid="121"/>
+                                          <p:spTgt spid="125"/>
                                         </p:tgtEl>
                                         <p:attrNameLst>
                                           <p:attrName>style.visibility</p:attrName>
@@ -6474,9 +7106,9 @@
                                     </p:set>
                                     <p:animEffect filter="fade" transition="in">
                                       <p:cBhvr>
-                                        <p:cTn dur="1000"/>
+                                        <p:cTn dur="1300"/>
                                         <p:tgtEl>
-                                          <p:spTgt spid="121"/>
+                                          <p:spTgt spid="125"/>
                                         </p:tgtEl>
                                       </p:cBhvr>
                                     </p:animEffect>
@@ -6497,7 +7129,7 @@
                                           </p:stCondLst>
                                         </p:cTn>
                                         <p:tgtEl>
-                                          <p:spTgt spid="120"/>
+                                          <p:spTgt spid="126"/>
                                         </p:tgtEl>
                                         <p:attrNameLst>
                                           <p:attrName>style.visibility</p:attrName>
@@ -6511,7 +7143,77 @@
                                       <p:cBhvr>
                                         <p:cTn dur="1000"/>
                                         <p:tgtEl>
-                                          <p:spTgt spid="120"/>
+                                          <p:spTgt spid="126"/>
+                                        </p:tgtEl>
+                                      </p:cBhvr>
+                                    </p:animEffect>
+                                  </p:childTnLst>
+                                </p:cTn>
+                              </p:par>
+                              <p:par>
+                                <p:cTn fill="hold" nodeType="withEffect" presetClass="entr" presetID="10" presetSubtype="0">
+                                  <p:stCondLst>
+                                    <p:cond delay="0"/>
+                                  </p:stCondLst>
+                                  <p:childTnLst>
+                                    <p:set>
+                                      <p:cBhvr>
+                                        <p:cTn dur="1" fill="hold">
+                                          <p:stCondLst>
+                                            <p:cond delay="0"/>
+                                          </p:stCondLst>
+                                        </p:cTn>
+                                        <p:tgtEl>
+                                          <p:spTgt spid="128"/>
+                                        </p:tgtEl>
+                                        <p:attrNameLst>
+                                          <p:attrName>style.visibility</p:attrName>
+                                        </p:attrNameLst>
+                                      </p:cBhvr>
+                                      <p:to>
+                                        <p:strVal val="visible"/>
+                                      </p:to>
+                                    </p:set>
+                                    <p:animEffect filter="fade" transition="in">
+                                      <p:cBhvr>
+                                        <p:cTn dur="1000"/>
+                                        <p:tgtEl>
+                                          <p:spTgt spid="128"/>
+                                        </p:tgtEl>
+                                      </p:cBhvr>
+                                    </p:animEffect>
+                                  </p:childTnLst>
+                                </p:cTn>
+                              </p:par>
+                              <p:par>
+                                <p:cTn fill="hold" nodeType="withEffect" presetClass="entr" presetID="10" presetSubtype="0">
+                                  <p:stCondLst>
+                                    <p:cond delay="0"/>
+                                  </p:stCondLst>
+                                  <p:childTnLst>
+                                    <p:set>
+                                      <p:cBhvr>
+                                        <p:cTn dur="1" fill="hold">
+                                          <p:stCondLst>
+                                            <p:cond delay="0"/>
+                                          </p:stCondLst>
+                                        </p:cTn>
+                                        <p:tgtEl>
+                                          <p:spTgt spid="127"/>
+                                        </p:tgtEl>
+                                        <p:attrNameLst>
+                                          <p:attrName>style.visibility</p:attrName>
+                                        </p:attrNameLst>
+                                      </p:cBhvr>
+                                      <p:to>
+                                        <p:strVal val="visible"/>
+                                      </p:to>
+                                    </p:set>
+                                    <p:animEffect filter="fade" transition="in">
+                                      <p:cBhvr>
+                                        <p:cTn dur="1000"/>
+                                        <p:tgtEl>
+                                          <p:spTgt spid="127"/>
                                         </p:tgtEl>
                                       </p:cBhvr>
                                     </p:animEffect>
@@ -6541,7 +7243,7 @@
                                           </p:stCondLst>
                                         </p:cTn>
                                         <p:tgtEl>
-                                          <p:spTgt spid="125"/>
+                                          <p:spTgt spid="132"/>
                                         </p:tgtEl>
                                         <p:attrNameLst>
                                           <p:attrName>style.visibility</p:attrName>
@@ -6555,7 +7257,7 @@
                                       <p:cBhvr>
                                         <p:cTn dur="1"/>
                                         <p:tgtEl>
-                                          <p:spTgt spid="125"/>
+                                          <p:spTgt spid="132"/>
                                         </p:tgtEl>
                                       </p:cBhvr>
                                     </p:animEffect>
@@ -6593,12 +7295,12 @@
 </p:sld>
 </file>
 
-<file path=ppt/slides/slide13.xml><?xml version="1.0" encoding="utf-8"?>
+<file path=ppt/slides/slide14.xml><?xml version="1.0" encoding="utf-8"?>
 <p:sld xmlns:a="http://schemas.openxmlformats.org/drawingml/2006/main" xmlns:r="http://schemas.openxmlformats.org/officeDocument/2006/relationships" xmlns:mc="http://schemas.openxmlformats.org/markup-compatibility/2006" xmlns:mv="urn:schemas-microsoft-com:mac:vml" xmlns:p="http://schemas.openxmlformats.org/presentationml/2006/main" xmlns:c="http://schemas.openxmlformats.org/drawingml/2006/chart" xmlns:dgm="http://schemas.openxmlformats.org/drawingml/2006/diagram" xmlns:o="urn:schemas-microsoft-com:office:office" xmlns:v="urn:schemas-microsoft-com:vml" xmlns:pvml="urn:schemas-microsoft-com:office:powerpoint" xmlns:com="http://schemas.openxmlformats.org/drawingml/2006/compatibility" xmlns:p14="http://schemas.microsoft.com/office/powerpoint/2010/main">
   <p:cSld>
     <p:spTree>
       <p:nvGrpSpPr>
-        <p:cNvPr id="131" name="Shape 131"/>
+        <p:cNvPr id="138" name="Shape 138"/>
         <p:cNvGrpSpPr/>
         <p:nvPr/>
       </p:nvGrpSpPr>
@@ -6612,7 +7314,7 @@
       </p:grpSpPr>
       <p:sp>
         <p:nvSpPr>
-          <p:cNvPr id="132" name="Shape 132"/>
+          <p:cNvPr id="139" name="Shape 139"/>
           <p:cNvSpPr txBox="1"/>
           <p:nvPr>
             <p:ph type="title"/>
@@ -6648,7 +7350,7 @@
       </p:sp>
       <p:sp>
         <p:nvSpPr>
-          <p:cNvPr id="133" name="Shape 133"/>
+          <p:cNvPr id="140" name="Shape 140"/>
           <p:cNvSpPr txBox="1"/>
           <p:nvPr>
             <p:ph idx="1" type="body"/>
@@ -8614,9 +9316,9 @@
               <a:buNone/>
             </a:pPr>
             <a:r>
-              <a:rPr lang="en"/>
-              <a:t>Growth</a:t>
+              <a:t/>
             </a:r>
+            <a:endParaRPr/>
           </a:p>
         </p:txBody>
       </p:sp>
@@ -8672,6 +9374,134 @@
         </p:blipFill>
         <p:spPr>
           <a:xfrm>
+            <a:off x="47300" y="1796825"/>
+            <a:ext cx="9096699" cy="5061175"/>
+          </a:xfrm>
+          <a:prstGeom prst="rect">
+            <a:avLst/>
+          </a:prstGeom>
+          <a:noFill/>
+          <a:ln>
+            <a:noFill/>
+          </a:ln>
+        </p:spPr>
+      </p:pic>
+    </p:spTree>
+  </p:cSld>
+  <p:clrMapOvr>
+    <a:masterClrMapping/>
+  </p:clrMapOvr>
+  <p:transition spd="slow">
+    <p:cut/>
+  </p:transition>
+</p:sld>
+</file>
+
+<file path=ppt/slides/slide6.xml><?xml version="1.0" encoding="utf-8"?>
+<p:sld xmlns:a="http://schemas.openxmlformats.org/drawingml/2006/main" xmlns:r="http://schemas.openxmlformats.org/officeDocument/2006/relationships" xmlns:mc="http://schemas.openxmlformats.org/markup-compatibility/2006" xmlns:mv="urn:schemas-microsoft-com:mac:vml" xmlns:p="http://schemas.openxmlformats.org/presentationml/2006/main" xmlns:c="http://schemas.openxmlformats.org/drawingml/2006/chart" xmlns:dgm="http://schemas.openxmlformats.org/drawingml/2006/diagram" xmlns:o="urn:schemas-microsoft-com:office:office" xmlns:v="urn:schemas-microsoft-com:vml" xmlns:pvml="urn:schemas-microsoft-com:office:powerpoint" xmlns:com="http://schemas.openxmlformats.org/drawingml/2006/compatibility" xmlns:p14="http://schemas.microsoft.com/office/powerpoint/2010/main">
+  <p:cSld>
+    <p:spTree>
+      <p:nvGrpSpPr>
+        <p:cNvPr id="67" name="Shape 67"/>
+        <p:cNvGrpSpPr/>
+        <p:nvPr/>
+      </p:nvGrpSpPr>
+      <p:grpSpPr>
+        <a:xfrm>
+          <a:off x="0" y="0"/>
+          <a:ext cx="0" cy="0"/>
+          <a:chOff x="0" y="0"/>
+          <a:chExt cx="0" cy="0"/>
+        </a:xfrm>
+      </p:grpSpPr>
+      <p:sp>
+        <p:nvSpPr>
+          <p:cNvPr id="68" name="Shape 68"/>
+          <p:cNvSpPr txBox="1"/>
+          <p:nvPr>
+            <p:ph type="title"/>
+          </p:nvPr>
+        </p:nvSpPr>
+        <p:spPr>
+          <a:xfrm>
+            <a:off x="457200" y="274637"/>
+            <a:ext cx="8229600" cy="1522199"/>
+          </a:xfrm>
+          <a:prstGeom prst="rect">
+            <a:avLst/>
+          </a:prstGeom>
+        </p:spPr>
+        <p:txBody>
+          <a:bodyPr anchorCtr="0" anchor="b" bIns="91425" lIns="91425" rIns="91425" tIns="91425">
+            <a:noAutofit/>
+          </a:bodyPr>
+          <a:lstStyle/>
+          <a:p>
+            <a:pPr>
+              <a:spcBef>
+                <a:spcPts val="0"/>
+              </a:spcBef>
+              <a:buNone/>
+            </a:pPr>
+            <a:r>
+              <a:rPr lang="en"/>
+              <a:t>Growth</a:t>
+            </a:r>
+          </a:p>
+        </p:txBody>
+      </p:sp>
+      <p:sp>
+        <p:nvSpPr>
+          <p:cNvPr id="69" name="Shape 69"/>
+          <p:cNvSpPr txBox="1"/>
+          <p:nvPr>
+            <p:ph idx="1" type="body"/>
+          </p:nvPr>
+        </p:nvSpPr>
+        <p:spPr>
+          <a:xfrm>
+            <a:off x="457200" y="1947332"/>
+            <a:ext cx="8229600" cy="4620299"/>
+          </a:xfrm>
+          <a:prstGeom prst="rect">
+            <a:avLst/>
+          </a:prstGeom>
+        </p:spPr>
+        <p:txBody>
+          <a:bodyPr anchorCtr="0" anchor="t" bIns="91425" lIns="91425" rIns="91425" tIns="91425">
+            <a:noAutofit/>
+          </a:bodyPr>
+          <a:lstStyle/>
+          <a:p>
+            <a:pPr>
+              <a:spcBef>
+                <a:spcPts val="0"/>
+              </a:spcBef>
+              <a:buNone/>
+            </a:pPr>
+            <a:r>
+              <a:t/>
+            </a:r>
+            <a:endParaRPr/>
+          </a:p>
+        </p:txBody>
+      </p:sp>
+      <p:pic>
+        <p:nvPicPr>
+          <p:cNvPr id="70" name="Shape 70"/>
+          <p:cNvPicPr preferRelativeResize="0"/>
+          <p:nvPr/>
+        </p:nvPicPr>
+        <p:blipFill>
+          <a:blip r:embed="rId3">
+            <a:alphaModFix/>
+          </a:blip>
+          <a:stretch>
+            <a:fillRect/>
+          </a:stretch>
+        </p:blipFill>
+        <p:spPr>
+          <a:xfrm>
             <a:off x="0" y="1898761"/>
             <a:ext cx="9144000" cy="4959227"/>
           </a:xfrm>
@@ -8686,7 +9516,7 @@
       </p:pic>
       <p:sp>
         <p:nvSpPr>
-          <p:cNvPr id="64" name="Shape 64"/>
+          <p:cNvPr id="71" name="Shape 71"/>
           <p:cNvSpPr/>
           <p:nvPr/>
         </p:nvSpPr>
@@ -8724,134 +9554,6 @@
           </a:p>
         </p:txBody>
       </p:sp>
-    </p:spTree>
-  </p:cSld>
-  <p:clrMapOvr>
-    <a:masterClrMapping/>
-  </p:clrMapOvr>
-  <p:transition spd="slow">
-    <p:cut/>
-  </p:transition>
-</p:sld>
-</file>
-
-<file path=ppt/slides/slide6.xml><?xml version="1.0" encoding="utf-8"?>
-<p:sld xmlns:a="http://schemas.openxmlformats.org/drawingml/2006/main" xmlns:r="http://schemas.openxmlformats.org/officeDocument/2006/relationships" xmlns:mc="http://schemas.openxmlformats.org/markup-compatibility/2006" xmlns:mv="urn:schemas-microsoft-com:mac:vml" xmlns:p="http://schemas.openxmlformats.org/presentationml/2006/main" xmlns:c="http://schemas.openxmlformats.org/drawingml/2006/chart" xmlns:dgm="http://schemas.openxmlformats.org/drawingml/2006/diagram" xmlns:o="urn:schemas-microsoft-com:office:office" xmlns:v="urn:schemas-microsoft-com:vml" xmlns:pvml="urn:schemas-microsoft-com:office:powerpoint" xmlns:com="http://schemas.openxmlformats.org/drawingml/2006/compatibility" xmlns:p14="http://schemas.microsoft.com/office/powerpoint/2010/main">
-  <p:cSld>
-    <p:spTree>
-      <p:nvGrpSpPr>
-        <p:cNvPr id="68" name="Shape 68"/>
-        <p:cNvGrpSpPr/>
-        <p:nvPr/>
-      </p:nvGrpSpPr>
-      <p:grpSpPr>
-        <a:xfrm>
-          <a:off x="0" y="0"/>
-          <a:ext cx="0" cy="0"/>
-          <a:chOff x="0" y="0"/>
-          <a:chExt cx="0" cy="0"/>
-        </a:xfrm>
-      </p:grpSpPr>
-      <p:sp>
-        <p:nvSpPr>
-          <p:cNvPr id="69" name="Shape 69"/>
-          <p:cNvSpPr txBox="1"/>
-          <p:nvPr>
-            <p:ph type="title"/>
-          </p:nvPr>
-        </p:nvSpPr>
-        <p:spPr>
-          <a:xfrm>
-            <a:off x="457200" y="274637"/>
-            <a:ext cx="8229600" cy="1522199"/>
-          </a:xfrm>
-          <a:prstGeom prst="rect">
-            <a:avLst/>
-          </a:prstGeom>
-        </p:spPr>
-        <p:txBody>
-          <a:bodyPr anchorCtr="0" anchor="b" bIns="91425" lIns="91425" rIns="91425" tIns="91425">
-            <a:noAutofit/>
-          </a:bodyPr>
-          <a:lstStyle/>
-          <a:p>
-            <a:pPr>
-              <a:spcBef>
-                <a:spcPts val="0"/>
-              </a:spcBef>
-              <a:buNone/>
-            </a:pPr>
-            <a:r>
-              <a:rPr lang="en"/>
-              <a:t>Mortality</a:t>
-            </a:r>
-          </a:p>
-        </p:txBody>
-      </p:sp>
-      <p:sp>
-        <p:nvSpPr>
-          <p:cNvPr id="70" name="Shape 70"/>
-          <p:cNvSpPr txBox="1"/>
-          <p:nvPr>
-            <p:ph idx="1" type="body"/>
-          </p:nvPr>
-        </p:nvSpPr>
-        <p:spPr>
-          <a:xfrm>
-            <a:off x="457200" y="1947332"/>
-            <a:ext cx="8229600" cy="4620299"/>
-          </a:xfrm>
-          <a:prstGeom prst="rect">
-            <a:avLst/>
-          </a:prstGeom>
-        </p:spPr>
-        <p:txBody>
-          <a:bodyPr anchorCtr="0" anchor="t" bIns="91425" lIns="91425" rIns="91425" tIns="91425">
-            <a:noAutofit/>
-          </a:bodyPr>
-          <a:lstStyle/>
-          <a:p>
-            <a:pPr>
-              <a:spcBef>
-                <a:spcPts val="0"/>
-              </a:spcBef>
-              <a:buNone/>
-            </a:pPr>
-            <a:r>
-              <a:t/>
-            </a:r>
-            <a:endParaRPr/>
-          </a:p>
-        </p:txBody>
-      </p:sp>
-      <p:pic>
-        <p:nvPicPr>
-          <p:cNvPr id="71" name="Shape 71"/>
-          <p:cNvPicPr preferRelativeResize="0"/>
-          <p:nvPr/>
-        </p:nvPicPr>
-        <p:blipFill>
-          <a:blip r:embed="rId3">
-            <a:alphaModFix/>
-          </a:blip>
-          <a:stretch>
-            <a:fillRect/>
-          </a:stretch>
-        </p:blipFill>
-        <p:spPr>
-          <a:xfrm>
-            <a:off x="-12" y="1895462"/>
-            <a:ext cx="8734425" cy="4962525"/>
-          </a:xfrm>
-          <a:prstGeom prst="rect">
-            <a:avLst/>
-          </a:prstGeom>
-          <a:noFill/>
-          <a:ln>
-            <a:noFill/>
-          </a:ln>
-        </p:spPr>
-      </p:pic>
     </p:spTree>
   </p:cSld>
   <p:clrMapOvr>
@@ -8903,6 +9605,134 @@
           </a:bodyPr>
           <a:lstStyle/>
           <a:p>
+            <a:pPr>
+              <a:spcBef>
+                <a:spcPts val="0"/>
+              </a:spcBef>
+              <a:buNone/>
+            </a:pPr>
+            <a:r>
+              <a:rPr lang="en"/>
+              <a:t>Mortality</a:t>
+            </a:r>
+          </a:p>
+        </p:txBody>
+      </p:sp>
+      <p:sp>
+        <p:nvSpPr>
+          <p:cNvPr id="77" name="Shape 77"/>
+          <p:cNvSpPr txBox="1"/>
+          <p:nvPr>
+            <p:ph idx="1" type="body"/>
+          </p:nvPr>
+        </p:nvSpPr>
+        <p:spPr>
+          <a:xfrm>
+            <a:off x="457200" y="1947332"/>
+            <a:ext cx="8229600" cy="4620299"/>
+          </a:xfrm>
+          <a:prstGeom prst="rect">
+            <a:avLst/>
+          </a:prstGeom>
+        </p:spPr>
+        <p:txBody>
+          <a:bodyPr anchorCtr="0" anchor="t" bIns="91425" lIns="91425" rIns="91425" tIns="91425">
+            <a:noAutofit/>
+          </a:bodyPr>
+          <a:lstStyle/>
+          <a:p>
+            <a:pPr>
+              <a:spcBef>
+                <a:spcPts val="0"/>
+              </a:spcBef>
+              <a:buNone/>
+            </a:pPr>
+            <a:r>
+              <a:t/>
+            </a:r>
+            <a:endParaRPr/>
+          </a:p>
+        </p:txBody>
+      </p:sp>
+      <p:pic>
+        <p:nvPicPr>
+          <p:cNvPr id="78" name="Shape 78"/>
+          <p:cNvPicPr preferRelativeResize="0"/>
+          <p:nvPr/>
+        </p:nvPicPr>
+        <p:blipFill>
+          <a:blip r:embed="rId3">
+            <a:alphaModFix/>
+          </a:blip>
+          <a:stretch>
+            <a:fillRect/>
+          </a:stretch>
+        </p:blipFill>
+        <p:spPr>
+          <a:xfrm>
+            <a:off x="-12" y="1895462"/>
+            <a:ext cx="8734425" cy="4962525"/>
+          </a:xfrm>
+          <a:prstGeom prst="rect">
+            <a:avLst/>
+          </a:prstGeom>
+          <a:noFill/>
+          <a:ln>
+            <a:noFill/>
+          </a:ln>
+        </p:spPr>
+      </p:pic>
+    </p:spTree>
+  </p:cSld>
+  <p:clrMapOvr>
+    <a:masterClrMapping/>
+  </p:clrMapOvr>
+  <p:transition spd="slow">
+    <p:cut/>
+  </p:transition>
+</p:sld>
+</file>
+
+<file path=ppt/slides/slide8.xml><?xml version="1.0" encoding="utf-8"?>
+<p:sld xmlns:a="http://schemas.openxmlformats.org/drawingml/2006/main" xmlns:r="http://schemas.openxmlformats.org/officeDocument/2006/relationships" xmlns:mc="http://schemas.openxmlformats.org/markup-compatibility/2006" xmlns:mv="urn:schemas-microsoft-com:mac:vml" xmlns:p="http://schemas.openxmlformats.org/presentationml/2006/main" xmlns:c="http://schemas.openxmlformats.org/drawingml/2006/chart" xmlns:dgm="http://schemas.openxmlformats.org/drawingml/2006/diagram" xmlns:o="urn:schemas-microsoft-com:office:office" xmlns:v="urn:schemas-microsoft-com:vml" xmlns:pvml="urn:schemas-microsoft-com:office:powerpoint" xmlns:com="http://schemas.openxmlformats.org/drawingml/2006/compatibility" xmlns:p14="http://schemas.microsoft.com/office/powerpoint/2010/main">
+  <p:cSld>
+    <p:spTree>
+      <p:nvGrpSpPr>
+        <p:cNvPr id="82" name="Shape 82"/>
+        <p:cNvGrpSpPr/>
+        <p:nvPr/>
+      </p:nvGrpSpPr>
+      <p:grpSpPr>
+        <a:xfrm>
+          <a:off x="0" y="0"/>
+          <a:ext cx="0" cy="0"/>
+          <a:chOff x="0" y="0"/>
+          <a:chExt cx="0" cy="0"/>
+        </a:xfrm>
+      </p:grpSpPr>
+      <p:sp>
+        <p:nvSpPr>
+          <p:cNvPr id="83" name="Shape 83"/>
+          <p:cNvSpPr txBox="1"/>
+          <p:nvPr>
+            <p:ph type="title"/>
+          </p:nvPr>
+        </p:nvSpPr>
+        <p:spPr>
+          <a:xfrm>
+            <a:off x="457200" y="274637"/>
+            <a:ext cx="8229600" cy="1522199"/>
+          </a:xfrm>
+          <a:prstGeom prst="rect">
+            <a:avLst/>
+          </a:prstGeom>
+        </p:spPr>
+        <p:txBody>
+          <a:bodyPr anchorCtr="0" anchor="b" bIns="91425" lIns="91425" rIns="91425" tIns="91425">
+            <a:noAutofit/>
+          </a:bodyPr>
+          <a:lstStyle/>
+          <a:p>
             <a:pPr lvl="0" rtl="0">
               <a:spcBef>
                 <a:spcPts val="0"/>
@@ -8918,7 +9748,7 @@
       </p:sp>
       <p:sp>
         <p:nvSpPr>
-          <p:cNvPr id="77" name="Shape 77"/>
+          <p:cNvPr id="84" name="Shape 84"/>
           <p:cNvSpPr txBox="1"/>
           <p:nvPr>
             <p:ph idx="1" type="body"/>
@@ -9054,7 +9884,7 @@
                                           </p:stCondLst>
                                         </p:cTn>
                                         <p:tgtEl>
-                                          <p:spTgt spid="77">
+                                          <p:spTgt spid="84">
                                             <p:txEl>
                                               <p:pRg end="0" st="0"/>
                                             </p:txEl>
@@ -9072,7 +9902,7 @@
                                       <p:cBhvr>
                                         <p:cTn dur="1"/>
                                         <p:tgtEl>
-                                          <p:spTgt spid="77">
+                                          <p:spTgt spid="84">
                                             <p:txEl>
                                               <p:pRg end="0" st="0"/>
                                             </p:txEl>
@@ -9115,7 +9945,7 @@
                                           </p:stCondLst>
                                         </p:cTn>
                                         <p:tgtEl>
-                                          <p:spTgt spid="77">
+                                          <p:spTgt spid="84">
                                             <p:txEl>
                                               <p:pRg end="1" st="1"/>
                                             </p:txEl>
@@ -9133,7 +9963,7 @@
                                       <p:cBhvr>
                                         <p:cTn dur="1"/>
                                         <p:tgtEl>
-                                          <p:spTgt spid="77">
+                                          <p:spTgt spid="84">
                                             <p:txEl>
                                               <p:pRg end="1" st="1"/>
                                             </p:txEl>
@@ -9176,7 +10006,7 @@
                                           </p:stCondLst>
                                         </p:cTn>
                                         <p:tgtEl>
-                                          <p:spTgt spid="77">
+                                          <p:spTgt spid="84">
                                             <p:txEl>
                                               <p:pRg end="2" st="2"/>
                                             </p:txEl>
@@ -9194,7 +10024,7 @@
                                       <p:cBhvr>
                                         <p:cTn dur="1"/>
                                         <p:tgtEl>
-                                          <p:spTgt spid="77">
+                                          <p:spTgt spid="84">
                                             <p:txEl>
                                               <p:pRg end="2" st="2"/>
                                             </p:txEl>
@@ -9237,7 +10067,7 @@
                                           </p:stCondLst>
                                         </p:cTn>
                                         <p:tgtEl>
-                                          <p:spTgt spid="77">
+                                          <p:spTgt spid="84">
                                             <p:txEl>
                                               <p:pRg end="3" st="3"/>
                                             </p:txEl>
@@ -9255,7 +10085,7 @@
                                       <p:cBhvr>
                                         <p:cTn dur="1"/>
                                         <p:tgtEl>
-                                          <p:spTgt spid="77">
+                                          <p:spTgt spid="84">
                                             <p:txEl>
                                               <p:pRg end="3" st="3"/>
                                             </p:txEl>
@@ -9297,12 +10127,12 @@
 </p:sld>
 </file>
 
-<file path=ppt/slides/slide8.xml><?xml version="1.0" encoding="utf-8"?>
+<file path=ppt/slides/slide9.xml><?xml version="1.0" encoding="utf-8"?>
 <p:sld xmlns:a="http://schemas.openxmlformats.org/drawingml/2006/main" xmlns:r="http://schemas.openxmlformats.org/officeDocument/2006/relationships" xmlns:mc="http://schemas.openxmlformats.org/markup-compatibility/2006" xmlns:mv="urn:schemas-microsoft-com:mac:vml" xmlns:p="http://schemas.openxmlformats.org/presentationml/2006/main" xmlns:c="http://schemas.openxmlformats.org/drawingml/2006/chart" xmlns:dgm="http://schemas.openxmlformats.org/drawingml/2006/diagram" xmlns:o="urn:schemas-microsoft-com:office:office" xmlns:v="urn:schemas-microsoft-com:vml" xmlns:pvml="urn:schemas-microsoft-com:office:powerpoint" xmlns:com="http://schemas.openxmlformats.org/drawingml/2006/compatibility" xmlns:p14="http://schemas.microsoft.com/office/powerpoint/2010/main">
   <p:cSld>
     <p:spTree>
       <p:nvGrpSpPr>
-        <p:cNvPr id="81" name="Shape 81"/>
+        <p:cNvPr id="88" name="Shape 88"/>
         <p:cNvGrpSpPr/>
         <p:nvPr/>
       </p:nvGrpSpPr>
@@ -9316,7 +10146,7 @@
       </p:grpSpPr>
       <p:sp>
         <p:nvSpPr>
-          <p:cNvPr id="82" name="Shape 82"/>
+          <p:cNvPr id="89" name="Shape 89"/>
           <p:cNvSpPr txBox="1"/>
           <p:nvPr>
             <p:ph type="title"/>
@@ -9352,7 +10182,7 @@
       </p:sp>
       <p:sp>
         <p:nvSpPr>
-          <p:cNvPr id="83" name="Shape 83"/>
+          <p:cNvPr id="90" name="Shape 90"/>
           <p:cNvSpPr txBox="1"/>
           <p:nvPr>
             <p:ph idx="1" type="body"/>
@@ -9476,7 +10306,7 @@
                                           </p:stCondLst>
                                         </p:cTn>
                                         <p:tgtEl>
-                                          <p:spTgt spid="83">
+                                          <p:spTgt spid="90">
                                             <p:txEl>
                                               <p:pRg end="0" st="0"/>
                                             </p:txEl>
@@ -9494,7 +10324,7 @@
                                       <p:cBhvr>
                                         <p:cTn dur="1"/>
                                         <p:tgtEl>
-                                          <p:spTgt spid="83">
+                                          <p:spTgt spid="90">
                                             <p:txEl>
                                               <p:pRg end="0" st="0"/>
                                             </p:txEl>
@@ -9537,7 +10367,7 @@
                                           </p:stCondLst>
                                         </p:cTn>
                                         <p:tgtEl>
-                                          <p:spTgt spid="83">
+                                          <p:spTgt spid="90">
                                             <p:txEl>
                                               <p:pRg end="1" st="1"/>
                                             </p:txEl>
@@ -9555,7 +10385,7 @@
                                       <p:cBhvr>
                                         <p:cTn dur="1"/>
                                         <p:tgtEl>
-                                          <p:spTgt spid="83">
+                                          <p:spTgt spid="90">
                                             <p:txEl>
                                               <p:pRg end="1" st="1"/>
                                             </p:txEl>
@@ -9598,7 +10428,7 @@
                                           </p:stCondLst>
                                         </p:cTn>
                                         <p:tgtEl>
-                                          <p:spTgt spid="83">
+                                          <p:spTgt spid="90">
                                             <p:txEl>
                                               <p:pRg end="2" st="2"/>
                                             </p:txEl>
@@ -9616,7 +10446,7 @@
                                       <p:cBhvr>
                                         <p:cTn dur="1"/>
                                         <p:tgtEl>
-                                          <p:spTgt spid="83">
+                                          <p:spTgt spid="90">
                                             <p:txEl>
                                               <p:pRg end="2" st="2"/>
                                             </p:txEl>
@@ -9658,603 +10488,284 @@
 </p:sld>
 </file>
 
-<file path=ppt/slides/slide9.xml><?xml version="1.0" encoding="utf-8"?>
-<p:sld xmlns:a="http://schemas.openxmlformats.org/drawingml/2006/main" xmlns:r="http://schemas.openxmlformats.org/officeDocument/2006/relationships" xmlns:mc="http://schemas.openxmlformats.org/markup-compatibility/2006" xmlns:mv="urn:schemas-microsoft-com:mac:vml" xmlns:p="http://schemas.openxmlformats.org/presentationml/2006/main" xmlns:c="http://schemas.openxmlformats.org/drawingml/2006/chart" xmlns:dgm="http://schemas.openxmlformats.org/drawingml/2006/diagram" xmlns:o="urn:schemas-microsoft-com:office:office" xmlns:v="urn:schemas-microsoft-com:vml" xmlns:pvml="urn:schemas-microsoft-com:office:powerpoint" xmlns:com="http://schemas.openxmlformats.org/drawingml/2006/compatibility" xmlns:p14="http://schemas.microsoft.com/office/powerpoint/2010/main">
-  <p:cSld>
-    <p:spTree>
-      <p:nvGrpSpPr>
-        <p:cNvPr id="87" name="Shape 87"/>
-        <p:cNvGrpSpPr/>
-        <p:nvPr/>
-      </p:nvGrpSpPr>
-      <p:grpSpPr>
-        <a:xfrm>
-          <a:off x="0" y="0"/>
-          <a:ext cx="0" cy="0"/>
-          <a:chOff x="0" y="0"/>
-          <a:chExt cx="0" cy="0"/>
-        </a:xfrm>
-      </p:grpSpPr>
-      <p:sp>
-        <p:nvSpPr>
-          <p:cNvPr id="88" name="Shape 88"/>
-          <p:cNvSpPr txBox="1"/>
-          <p:nvPr>
-            <p:ph type="title"/>
-          </p:nvPr>
-        </p:nvSpPr>
-        <p:spPr>
-          <a:xfrm>
-            <a:off x="457200" y="274637"/>
-            <a:ext cx="8229600" cy="1522199"/>
-          </a:xfrm>
-          <a:prstGeom prst="rect">
-            <a:avLst/>
-          </a:prstGeom>
-        </p:spPr>
-        <p:txBody>
-          <a:bodyPr anchorCtr="0" anchor="b" bIns="91425" lIns="91425" rIns="91425" tIns="91425">
-            <a:noAutofit/>
-          </a:bodyPr>
-          <a:lstStyle/>
-          <a:p>
-            <a:pPr>
-              <a:spcBef>
-                <a:spcPts val="0"/>
-              </a:spcBef>
-              <a:buNone/>
-            </a:pPr>
-            <a:r>
-              <a:rPr lang="en"/>
-              <a:t>Experimental Design</a:t>
-            </a:r>
-          </a:p>
-        </p:txBody>
-      </p:sp>
-      <p:sp>
-        <p:nvSpPr>
-          <p:cNvPr id="89" name="Shape 89"/>
-          <p:cNvSpPr txBox="1"/>
-          <p:nvPr>
-            <p:ph idx="1" type="body"/>
-          </p:nvPr>
-        </p:nvSpPr>
-        <p:spPr>
-          <a:xfrm>
-            <a:off x="457200" y="1947332"/>
-            <a:ext cx="8229600" cy="4620299"/>
-          </a:xfrm>
-          <a:prstGeom prst="rect">
-            <a:avLst/>
-          </a:prstGeom>
-        </p:spPr>
-        <p:txBody>
-          <a:bodyPr anchorCtr="0" anchor="t" bIns="91425" lIns="91425" rIns="91425" tIns="91425">
-            <a:noAutofit/>
-          </a:bodyPr>
-          <a:lstStyle/>
-          <a:p>
-            <a:pPr indent="-419100" lvl="0" marL="457200" rtl="0">
-              <a:lnSpc>
-                <a:spcPct val="150000"/>
-              </a:lnSpc>
-              <a:spcBef>
-                <a:spcPts val="0"/>
-              </a:spcBef>
-              <a:buClr>
-                <a:schemeClr val="dk2"/>
-              </a:buClr>
-              <a:buSzPct val="100000"/>
-              <a:buFont typeface="Arial"/>
-              <a:buChar char="●"/>
-            </a:pPr>
-            <a:r>
-              <a:rPr lang="en"/>
-              <a:t>What do you need to run your experiment?</a:t>
-            </a:r>
-          </a:p>
-          <a:p>
-            <a:pPr indent="-419100" lvl="0" marL="457200" rtl="0">
-              <a:lnSpc>
-                <a:spcPct val="150000"/>
-              </a:lnSpc>
-              <a:spcBef>
-                <a:spcPts val="0"/>
-              </a:spcBef>
-              <a:buClr>
-                <a:schemeClr val="dk2"/>
-              </a:buClr>
-              <a:buSzPct val="100000"/>
-              <a:buFont typeface="Arial"/>
-              <a:buChar char="●"/>
-            </a:pPr>
-            <a:r>
-              <a:rPr lang="en"/>
-              <a:t>What do you have to control?</a:t>
-            </a:r>
-          </a:p>
-          <a:p>
-            <a:pPr indent="-419100" lvl="0" marL="457200" rtl="0">
-              <a:lnSpc>
-                <a:spcPct val="150000"/>
-              </a:lnSpc>
-              <a:spcBef>
-                <a:spcPts val="0"/>
-              </a:spcBef>
-              <a:buClr>
-                <a:schemeClr val="dk2"/>
-              </a:buClr>
-              <a:buSzPct val="100000"/>
-              <a:buFont typeface="Arial"/>
-              <a:buChar char="●"/>
-            </a:pPr>
-            <a:r>
-              <a:rPr lang="en"/>
-              <a:t>What can you not control?</a:t>
-            </a:r>
-          </a:p>
-          <a:p>
-            <a:pPr indent="-419100" lvl="0" marL="457200" rtl="0">
-              <a:lnSpc>
-                <a:spcPct val="150000"/>
-              </a:lnSpc>
-              <a:spcBef>
-                <a:spcPts val="0"/>
-              </a:spcBef>
-              <a:buClr>
-                <a:schemeClr val="dk2"/>
-              </a:buClr>
-              <a:buSzPct val="100000"/>
-              <a:buFont typeface="Arial"/>
-              <a:buChar char="●"/>
-            </a:pPr>
-            <a:r>
-              <a:rPr lang="en"/>
-              <a:t>How will you collect samples?</a:t>
-            </a:r>
-          </a:p>
-          <a:p>
-            <a:pPr indent="-419100" lvl="0" marL="457200" rtl="0">
-              <a:lnSpc>
-                <a:spcPct val="150000"/>
-              </a:lnSpc>
-              <a:spcBef>
-                <a:spcPts val="0"/>
-              </a:spcBef>
-              <a:buClr>
-                <a:schemeClr val="dk2"/>
-              </a:buClr>
-              <a:buSzPct val="100000"/>
-              <a:buFont typeface="Arial"/>
-              <a:buChar char="●"/>
-            </a:pPr>
-            <a:r>
-              <a:rPr lang="en"/>
-              <a:t>How will you generate data to test?</a:t>
-            </a:r>
-          </a:p>
-          <a:p>
-            <a:pPr>
-              <a:spcBef>
-                <a:spcPts val="0"/>
-              </a:spcBef>
-              <a:buNone/>
-            </a:pPr>
-            <a:r>
-              <a:t/>
-            </a:r>
-            <a:endParaRPr/>
-          </a:p>
-        </p:txBody>
-      </p:sp>
-    </p:spTree>
-  </p:cSld>
-  <p:clrMapOvr>
-    <a:masterClrMapping/>
-  </p:clrMapOvr>
-  <p:transition spd="slow">
-    <p:cut/>
-  </p:transition>
-  <p:timing>
-    <p:tnLst>
-      <p:par>
-        <p:cTn dur="indefinite" nodeType="tmRoot" restart="never">
-          <p:childTnLst>
-            <p:seq concurrent="1" nextAc="seek">
-              <p:cTn dur="indefinite" id="2" nodeType="mainSeq">
-                <p:childTnLst>
-                  <p:par>
-                    <p:cTn fill="hold">
-                      <p:stCondLst>
-                        <p:cond delay="indefinite"/>
-                      </p:stCondLst>
-                      <p:childTnLst>
-                        <p:par>
-                          <p:cTn fill="hold">
-                            <p:stCondLst>
-                              <p:cond delay="0"/>
-                            </p:stCondLst>
-                            <p:childTnLst>
-                              <p:par>
-                                <p:cTn fill="hold" nodeType="clickEffect" presetClass="entr" presetID="10" presetSubtype="0">
-                                  <p:stCondLst>
-                                    <p:cond delay="0"/>
-                                  </p:stCondLst>
-                                  <p:childTnLst>
-                                    <p:set>
-                                      <p:cBhvr>
-                                        <p:cTn dur="1" fill="hold">
-                                          <p:stCondLst>
-                                            <p:cond delay="0"/>
-                                          </p:stCondLst>
-                                        </p:cTn>
-                                        <p:tgtEl>
-                                          <p:spTgt spid="89">
-                                            <p:txEl>
-                                              <p:pRg end="0" st="0"/>
-                                            </p:txEl>
-                                          </p:spTgt>
-                                        </p:tgtEl>
-                                        <p:attrNameLst>
-                                          <p:attrName>style.visibility</p:attrName>
-                                        </p:attrNameLst>
-                                      </p:cBhvr>
-                                      <p:to>
-                                        <p:strVal val="visible"/>
-                                      </p:to>
-                                    </p:set>
-                                    <p:animEffect filter="fade" transition="in">
-                                      <p:cBhvr>
-                                        <p:cTn dur="1"/>
-                                        <p:tgtEl>
-                                          <p:spTgt spid="89">
-                                            <p:txEl>
-                                              <p:pRg end="0" st="0"/>
-                                            </p:txEl>
-                                          </p:spTgt>
-                                        </p:tgtEl>
-                                      </p:cBhvr>
-                                    </p:animEffect>
-                                  </p:childTnLst>
-                                </p:cTn>
-                              </p:par>
-                            </p:childTnLst>
-                          </p:cTn>
-                        </p:par>
-                      </p:childTnLst>
-                    </p:cTn>
-                  </p:par>
-                  <p:par>
-                    <p:cTn fill="hold">
-                      <p:stCondLst>
-                        <p:cond delay="indefinite"/>
-                      </p:stCondLst>
-                      <p:childTnLst>
-                        <p:par>
-                          <p:cTn fill="hold">
-                            <p:stCondLst>
-                              <p:cond delay="0"/>
-                            </p:stCondLst>
-                            <p:childTnLst>
-                              <p:par>
-                                <p:cTn fill="hold" nodeType="clickEffect" presetClass="entr" presetID="10" presetSubtype="0">
-                                  <p:stCondLst>
-                                    <p:cond delay="0"/>
-                                  </p:stCondLst>
-                                  <p:childTnLst>
-                                    <p:set>
-                                      <p:cBhvr>
-                                        <p:cTn dur="1" fill="hold">
-                                          <p:stCondLst>
-                                            <p:cond delay="0"/>
-                                          </p:stCondLst>
-                                        </p:cTn>
-                                        <p:tgtEl>
-                                          <p:spTgt spid="89">
-                                            <p:txEl>
-                                              <p:pRg end="1" st="1"/>
-                                            </p:txEl>
-                                          </p:spTgt>
-                                        </p:tgtEl>
-                                        <p:attrNameLst>
-                                          <p:attrName>style.visibility</p:attrName>
-                                        </p:attrNameLst>
-                                      </p:cBhvr>
-                                      <p:to>
-                                        <p:strVal val="visible"/>
-                                      </p:to>
-                                    </p:set>
-                                    <p:animEffect filter="fade" transition="in">
-                                      <p:cBhvr>
-                                        <p:cTn dur="1"/>
-                                        <p:tgtEl>
-                                          <p:spTgt spid="89">
-                                            <p:txEl>
-                                              <p:pRg end="1" st="1"/>
-                                            </p:txEl>
-                                          </p:spTgt>
-                                        </p:tgtEl>
-                                      </p:cBhvr>
-                                    </p:animEffect>
-                                  </p:childTnLst>
-                                </p:cTn>
-                              </p:par>
-                            </p:childTnLst>
-                          </p:cTn>
-                        </p:par>
-                      </p:childTnLst>
-                    </p:cTn>
-                  </p:par>
-                  <p:par>
-                    <p:cTn fill="hold">
-                      <p:stCondLst>
-                        <p:cond delay="indefinite"/>
-                      </p:stCondLst>
-                      <p:childTnLst>
-                        <p:par>
-                          <p:cTn fill="hold">
-                            <p:stCondLst>
-                              <p:cond delay="0"/>
-                            </p:stCondLst>
-                            <p:childTnLst>
-                              <p:par>
-                                <p:cTn fill="hold" nodeType="clickEffect" presetClass="entr" presetID="10" presetSubtype="0">
-                                  <p:stCondLst>
-                                    <p:cond delay="0"/>
-                                  </p:stCondLst>
-                                  <p:childTnLst>
-                                    <p:set>
-                                      <p:cBhvr>
-                                        <p:cTn dur="1" fill="hold">
-                                          <p:stCondLst>
-                                            <p:cond delay="0"/>
-                                          </p:stCondLst>
-                                        </p:cTn>
-                                        <p:tgtEl>
-                                          <p:spTgt spid="89">
-                                            <p:txEl>
-                                              <p:pRg end="2" st="2"/>
-                                            </p:txEl>
-                                          </p:spTgt>
-                                        </p:tgtEl>
-                                        <p:attrNameLst>
-                                          <p:attrName>style.visibility</p:attrName>
-                                        </p:attrNameLst>
-                                      </p:cBhvr>
-                                      <p:to>
-                                        <p:strVal val="visible"/>
-                                      </p:to>
-                                    </p:set>
-                                    <p:animEffect filter="fade" transition="in">
-                                      <p:cBhvr>
-                                        <p:cTn dur="1"/>
-                                        <p:tgtEl>
-                                          <p:spTgt spid="89">
-                                            <p:txEl>
-                                              <p:pRg end="2" st="2"/>
-                                            </p:txEl>
-                                          </p:spTgt>
-                                        </p:tgtEl>
-                                      </p:cBhvr>
-                                    </p:animEffect>
-                                  </p:childTnLst>
-                                </p:cTn>
-                              </p:par>
-                            </p:childTnLst>
-                          </p:cTn>
-                        </p:par>
-                      </p:childTnLst>
-                    </p:cTn>
-                  </p:par>
-                  <p:par>
-                    <p:cTn fill="hold">
-                      <p:stCondLst>
-                        <p:cond delay="indefinite"/>
-                      </p:stCondLst>
-                      <p:childTnLst>
-                        <p:par>
-                          <p:cTn fill="hold">
-                            <p:stCondLst>
-                              <p:cond delay="0"/>
-                            </p:stCondLst>
-                            <p:childTnLst>
-                              <p:par>
-                                <p:cTn fill="hold" nodeType="clickEffect" presetClass="entr" presetID="10" presetSubtype="0">
-                                  <p:stCondLst>
-                                    <p:cond delay="0"/>
-                                  </p:stCondLst>
-                                  <p:childTnLst>
-                                    <p:set>
-                                      <p:cBhvr>
-                                        <p:cTn dur="1" fill="hold">
-                                          <p:stCondLst>
-                                            <p:cond delay="0"/>
-                                          </p:stCondLst>
-                                        </p:cTn>
-                                        <p:tgtEl>
-                                          <p:spTgt spid="89">
-                                            <p:txEl>
-                                              <p:pRg end="3" st="3"/>
-                                            </p:txEl>
-                                          </p:spTgt>
-                                        </p:tgtEl>
-                                        <p:attrNameLst>
-                                          <p:attrName>style.visibility</p:attrName>
-                                        </p:attrNameLst>
-                                      </p:cBhvr>
-                                      <p:to>
-                                        <p:strVal val="visible"/>
-                                      </p:to>
-                                    </p:set>
-                                    <p:animEffect filter="fade" transition="in">
-                                      <p:cBhvr>
-                                        <p:cTn dur="1"/>
-                                        <p:tgtEl>
-                                          <p:spTgt spid="89">
-                                            <p:txEl>
-                                              <p:pRg end="3" st="3"/>
-                                            </p:txEl>
-                                          </p:spTgt>
-                                        </p:tgtEl>
-                                      </p:cBhvr>
-                                    </p:animEffect>
-                                  </p:childTnLst>
-                                </p:cTn>
-                              </p:par>
-                            </p:childTnLst>
-                          </p:cTn>
-                        </p:par>
-                      </p:childTnLst>
-                    </p:cTn>
-                  </p:par>
-                  <p:par>
-                    <p:cTn fill="hold">
-                      <p:stCondLst>
-                        <p:cond delay="indefinite"/>
-                      </p:stCondLst>
-                      <p:childTnLst>
-                        <p:par>
-                          <p:cTn fill="hold">
-                            <p:stCondLst>
-                              <p:cond delay="0"/>
-                            </p:stCondLst>
-                            <p:childTnLst>
-                              <p:par>
-                                <p:cTn fill="hold" nodeType="clickEffect" presetClass="entr" presetID="10" presetSubtype="0">
-                                  <p:stCondLst>
-                                    <p:cond delay="0"/>
-                                  </p:stCondLst>
-                                  <p:childTnLst>
-                                    <p:set>
-                                      <p:cBhvr>
-                                        <p:cTn dur="1" fill="hold">
-                                          <p:stCondLst>
-                                            <p:cond delay="0"/>
-                                          </p:stCondLst>
-                                        </p:cTn>
-                                        <p:tgtEl>
-                                          <p:spTgt spid="89">
-                                            <p:txEl>
-                                              <p:pRg end="4" st="4"/>
-                                            </p:txEl>
-                                          </p:spTgt>
-                                        </p:tgtEl>
-                                        <p:attrNameLst>
-                                          <p:attrName>style.visibility</p:attrName>
-                                        </p:attrNameLst>
-                                      </p:cBhvr>
-                                      <p:to>
-                                        <p:strVal val="visible"/>
-                                      </p:to>
-                                    </p:set>
-                                    <p:animEffect filter="fade" transition="in">
-                                      <p:cBhvr>
-                                        <p:cTn dur="1"/>
-                                        <p:tgtEl>
-                                          <p:spTgt spid="89">
-                                            <p:txEl>
-                                              <p:pRg end="4" st="4"/>
-                                            </p:txEl>
-                                          </p:spTgt>
-                                        </p:tgtEl>
-                                      </p:cBhvr>
-                                    </p:animEffect>
-                                  </p:childTnLst>
-                                </p:cTn>
-                              </p:par>
-                            </p:childTnLst>
-                          </p:cTn>
-                        </p:par>
-                      </p:childTnLst>
-                    </p:cTn>
-                  </p:par>
-                  <p:par>
-                    <p:cTn fill="hold">
-                      <p:stCondLst>
-                        <p:cond delay="indefinite"/>
-                      </p:stCondLst>
-                      <p:childTnLst>
-                        <p:par>
-                          <p:cTn fill="hold">
-                            <p:stCondLst>
-                              <p:cond delay="0"/>
-                            </p:stCondLst>
-                            <p:childTnLst>
-                              <p:par>
-                                <p:cTn fill="hold" nodeType="clickEffect" presetClass="entr" presetID="10" presetSubtype="0">
-                                  <p:stCondLst>
-                                    <p:cond delay="0"/>
-                                  </p:stCondLst>
-                                  <p:childTnLst>
-                                    <p:set>
-                                      <p:cBhvr>
-                                        <p:cTn dur="1" fill="hold">
-                                          <p:stCondLst>
-                                            <p:cond delay="0"/>
-                                          </p:stCondLst>
-                                        </p:cTn>
-                                        <p:tgtEl>
-                                          <p:spTgt spid="89">
-                                            <p:txEl>
-                                              <p:pRg end="5" st="5"/>
-                                            </p:txEl>
-                                          </p:spTgt>
-                                        </p:tgtEl>
-                                        <p:attrNameLst>
-                                          <p:attrName>style.visibility</p:attrName>
-                                        </p:attrNameLst>
-                                      </p:cBhvr>
-                                      <p:to>
-                                        <p:strVal val="visible"/>
-                                      </p:to>
-                                    </p:set>
-                                    <p:animEffect filter="fade" transition="in">
-                                      <p:cBhvr>
-                                        <p:cTn dur="1"/>
-                                        <p:tgtEl>
-                                          <p:spTgt spid="89">
-                                            <p:txEl>
-                                              <p:pRg end="5" st="5"/>
-                                            </p:txEl>
-                                          </p:spTgt>
-                                        </p:tgtEl>
-                                      </p:cBhvr>
-                                    </p:animEffect>
-                                  </p:childTnLst>
-                                </p:cTn>
-                              </p:par>
-                            </p:childTnLst>
-                          </p:cTn>
-                        </p:par>
-                      </p:childTnLst>
-                    </p:cTn>
-                  </p:par>
-                </p:childTnLst>
-              </p:cTn>
-              <p:prevCondLst>
-                <p:cond evt="onPrev">
-                  <p:tgtEl>
-                    <p:sldTgt/>
-                  </p:tgtEl>
-                </p:cond>
-              </p:prevCondLst>
-              <p:nextCondLst>
-                <p:cond evt="onNext">
-                  <p:tgtEl>
-                    <p:sldTgt/>
-                  </p:tgtEl>
-                </p:cond>
-              </p:nextCondLst>
-            </p:seq>
-          </p:childTnLst>
-        </p:cTn>
-      </p:par>
-    </p:tnLst>
-  </p:timing>
-</p:sld>
+<file path=ppt/theme/theme1.xml><?xml version="1.0" encoding="utf-8"?>
+<a:theme xmlns:a="http://schemas.openxmlformats.org/drawingml/2006/main" xmlns:r="http://schemas.openxmlformats.org/officeDocument/2006/relationships" name="modern">
+  <a:themeElements>
+    <a:clrScheme name="Custom 348">
+      <a:dk1>
+        <a:srgbClr val="000000"/>
+      </a:dk1>
+      <a:lt1>
+        <a:srgbClr val="FFFFFF"/>
+      </a:lt1>
+      <a:dk2>
+        <a:srgbClr val="191919"/>
+      </a:dk2>
+      <a:lt2>
+        <a:srgbClr val="CCCCCC"/>
+      </a:lt2>
+      <a:accent1>
+        <a:srgbClr val="7E5554"/>
+      </a:accent1>
+      <a:accent2>
+        <a:srgbClr val="910A10"/>
+      </a:accent2>
+      <a:accent3>
+        <a:srgbClr val="84294D"/>
+      </a:accent3>
+      <a:accent4>
+        <a:srgbClr val="DA823B"/>
+      </a:accent4>
+      <a:accent5>
+        <a:srgbClr val="625D3C"/>
+      </a:accent5>
+      <a:accent6>
+        <a:srgbClr val="00384A"/>
+      </a:accent6>
+      <a:hlink>
+        <a:srgbClr val="227A78"/>
+      </a:hlink>
+      <a:folHlink>
+        <a:srgbClr val="394749"/>
+      </a:folHlink>
+    </a:clrScheme>
+    <a:fontScheme name="Office">
+      <a:majorFont>
+        <a:latin typeface="Arial"/>
+        <a:ea typeface=""/>
+        <a:cs typeface=""/>
+        <a:font script="Jpan" typeface="ＭＳ Ｐゴシック"/>
+        <a:font script="Hang" typeface="맑은 고딕"/>
+        <a:font script="Hans" typeface="宋体"/>
+        <a:font script="Hant" typeface="新細明體"/>
+        <a:font script="Arab" typeface="Times New Roman"/>
+        <a:font script="Hebr" typeface="Times New Roman"/>
+        <a:font script="Thai" typeface="Angsana New"/>
+        <a:font script="Ethi" typeface="Nyala"/>
+        <a:font script="Beng" typeface="Vrinda"/>
+        <a:font script="Gujr" typeface="Shruti"/>
+        <a:font script="Khmr" typeface="MoolBoran"/>
+        <a:font script="Knda" typeface="Tunga"/>
+        <a:font script="Guru" typeface="Raavi"/>
+        <a:font script="Cans" typeface="Euphemia"/>
+        <a:font script="Cher" typeface="Plantagenet Cherokee"/>
+        <a:font script="Yiii" typeface="Microsoft Yi Baiti"/>
+        <a:font script="Tibt" typeface="Microsoft Himalaya"/>
+        <a:font script="Thaa" typeface="MV Boli"/>
+        <a:font script="Deva" typeface="Mangal"/>
+        <a:font script="Telu" typeface="Gautami"/>
+        <a:font script="Taml" typeface="Latha"/>
+        <a:font script="Syrc" typeface="Estrangelo Edessa"/>
+        <a:font script="Orya" typeface="Kalinga"/>
+        <a:font script="Mlym" typeface="Kartika"/>
+        <a:font script="Laoo" typeface="DokChampa"/>
+        <a:font script="Sinh" typeface="Iskoola Pota"/>
+        <a:font script="Mong" typeface="Mongolian Baiti"/>
+        <a:font script="Viet" typeface="Times New Roman"/>
+        <a:font script="Uigh" typeface="Microsoft Uighur"/>
+      </a:majorFont>
+      <a:minorFont>
+        <a:latin typeface="Arial"/>
+        <a:ea typeface=""/>
+        <a:cs typeface=""/>
+        <a:font script="Jpan" typeface="ＭＳ Ｐゴシック"/>
+        <a:font script="Hang" typeface="맑은 고딕"/>
+        <a:font script="Hans" typeface="宋体"/>
+        <a:font script="Hant" typeface="新細明體"/>
+        <a:font script="Arab" typeface="Times New Roman"/>
+        <a:font script="Hebr" typeface="Times New Roman"/>
+        <a:font script="Thai" typeface="Angsana New"/>
+        <a:font script="Ethi" typeface="Nyala"/>
+        <a:font script="Beng" typeface="Vrinda"/>
+        <a:font script="Gujr" typeface="Shruti"/>
+        <a:font script="Khmr" typeface="MoolBoran"/>
+        <a:font script="Knda" typeface="Tunga"/>
+        <a:font script="Guru" typeface="Raavi"/>
+        <a:font script="Cans" typeface="Euphemia"/>
+        <a:font script="Cher" typeface="Plantagenet Cherokee"/>
+        <a:font script="Yiii" typeface="Microsoft Yi Baiti"/>
+        <a:font script="Tibt" typeface="Microsoft Himalaya"/>
+        <a:font script="Thaa" typeface="MV Boli"/>
+        <a:font script="Deva" typeface="Mangal"/>
+        <a:font script="Telu" typeface="Gautami"/>
+        <a:font script="Taml" typeface="Latha"/>
+        <a:font script="Syrc" typeface="Estrangelo Edessa"/>
+        <a:font script="Orya" typeface="Kalinga"/>
+        <a:font script="Mlym" typeface="Kartika"/>
+        <a:font script="Laoo" typeface="DokChampa"/>
+        <a:font script="Sinh" typeface="Iskoola Pota"/>
+        <a:font script="Mong" typeface="Mongolian Baiti"/>
+        <a:font script="Viet" typeface="Times New Roman"/>
+        <a:font script="Uigh" typeface="Microsoft Uighur"/>
+      </a:minorFont>
+    </a:fontScheme>
+    <a:fmtScheme name="Office">
+      <a:fillStyleLst>
+        <a:solidFill>
+          <a:schemeClr val="phClr"/>
+        </a:solidFill>
+        <a:gradFill rotWithShape="1">
+          <a:gsLst>
+            <a:gs pos="0">
+              <a:schemeClr val="phClr">
+                <a:tint val="50000"/>
+                <a:satMod val="300000"/>
+              </a:schemeClr>
+            </a:gs>
+            <a:gs pos="35000">
+              <a:schemeClr val="phClr">
+                <a:tint val="37000"/>
+                <a:satMod val="300000"/>
+              </a:schemeClr>
+            </a:gs>
+            <a:gs pos="100000">
+              <a:schemeClr val="phClr">
+                <a:tint val="15000"/>
+                <a:satMod val="350000"/>
+              </a:schemeClr>
+            </a:gs>
+          </a:gsLst>
+          <a:lin ang="16200000" scaled="1"/>
+        </a:gradFill>
+        <a:gradFill rotWithShape="1">
+          <a:gsLst>
+            <a:gs pos="0">
+              <a:schemeClr val="phClr">
+                <a:tint val="100000"/>
+                <a:shade val="100000"/>
+                <a:satMod val="130000"/>
+              </a:schemeClr>
+            </a:gs>
+            <a:gs pos="100000">
+              <a:schemeClr val="phClr">
+                <a:tint val="50000"/>
+                <a:shade val="100000"/>
+                <a:satMod val="350000"/>
+              </a:schemeClr>
+            </a:gs>
+          </a:gsLst>
+          <a:lin ang="16200000" scaled="0"/>
+        </a:gradFill>
+      </a:fillStyleLst>
+      <a:lnStyleLst>
+        <a:ln cap="flat" cmpd="sng" w="9525" algn="ctr">
+          <a:solidFill>
+            <a:schemeClr val="phClr">
+              <a:shade val="95000"/>
+              <a:satMod val="105000"/>
+            </a:schemeClr>
+          </a:solidFill>
+          <a:prstDash val="solid"/>
+        </a:ln>
+        <a:ln cap="flat" cmpd="sng" w="25400" algn="ctr">
+          <a:solidFill>
+            <a:schemeClr val="phClr"/>
+          </a:solidFill>
+          <a:prstDash val="solid"/>
+        </a:ln>
+        <a:ln cap="flat" cmpd="sng" w="38100" algn="ctr">
+          <a:solidFill>
+            <a:schemeClr val="phClr"/>
+          </a:solidFill>
+          <a:prstDash val="solid"/>
+        </a:ln>
+      </a:lnStyleLst>
+      <a:effectStyleLst>
+        <a:effectStyle>
+          <a:effectLst>
+            <a:outerShdw blurRad="40000" rotWithShape="0" dir="5400000" dist="20000">
+              <a:srgbClr val="000000">
+                <a:alpha val="38000"/>
+              </a:srgbClr>
+            </a:outerShdw>
+          </a:effectLst>
+        </a:effectStyle>
+        <a:effectStyle>
+          <a:effectLst>
+            <a:outerShdw blurRad="40000" rotWithShape="0" dir="5400000" dist="23000">
+              <a:srgbClr val="000000">
+                <a:alpha val="35000"/>
+              </a:srgbClr>
+            </a:outerShdw>
+          </a:effectLst>
+        </a:effectStyle>
+        <a:effectStyle>
+          <a:effectLst>
+            <a:outerShdw blurRad="40000" rotWithShape="0" dir="5400000" dist="23000">
+              <a:srgbClr val="000000">
+                <a:alpha val="35000"/>
+              </a:srgbClr>
+            </a:outerShdw>
+          </a:effectLst>
+          <a:scene3d>
+            <a:camera prst="orthographicFront">
+              <a:rot lat="0" lon="0" rev="0"/>
+            </a:camera>
+            <a:lightRig dir="t" rig="threePt">
+              <a:rot lat="0" lon="0" rev="1200000"/>
+            </a:lightRig>
+          </a:scene3d>
+          <a:sp3d>
+            <a:bevelT h="25400" w="63500"/>
+          </a:sp3d>
+        </a:effectStyle>
+      </a:effectStyleLst>
+      <a:bgFillStyleLst>
+        <a:solidFill>
+          <a:schemeClr val="phClr"/>
+        </a:solidFill>
+        <a:gradFill rotWithShape="1">
+          <a:gsLst>
+            <a:gs pos="0">
+              <a:schemeClr val="phClr">
+                <a:tint val="40000"/>
+                <a:satMod val="350000"/>
+              </a:schemeClr>
+            </a:gs>
+            <a:gs pos="40000">
+              <a:schemeClr val="phClr">
+                <a:tint val="45000"/>
+                <a:shade val="99000"/>
+                <a:satMod val="350000"/>
+              </a:schemeClr>
+            </a:gs>
+            <a:gs pos="100000">
+              <a:schemeClr val="phClr">
+                <a:shade val="20000"/>
+                <a:satMod val="255000"/>
+              </a:schemeClr>
+            </a:gs>
+          </a:gsLst>
+          <a:path path="circle">
+            <a:fillToRect b="180000" l="50000" r="50000" t="-80000"/>
+          </a:path>
+        </a:gradFill>
+        <a:gradFill rotWithShape="1">
+          <a:gsLst>
+            <a:gs pos="0">
+              <a:schemeClr val="phClr">
+                <a:tint val="80000"/>
+                <a:satMod val="300000"/>
+              </a:schemeClr>
+            </a:gs>
+            <a:gs pos="100000">
+              <a:schemeClr val="phClr">
+                <a:shade val="30000"/>
+                <a:satMod val="200000"/>
+              </a:schemeClr>
+            </a:gs>
+          </a:gsLst>
+          <a:path path="circle">
+            <a:fillToRect b="50000" l="50000" r="50000" t="50000"/>
+          </a:path>
+        </a:gradFill>
+      </a:bgFillStyleLst>
+    </a:fmtScheme>
+  </a:themeElements>
+</a:theme>
 </file>
 
-<file path=ppt/theme/theme1.xml><?xml version="1.0" encoding="utf-8"?>
+<file path=ppt/theme/theme2.xml><?xml version="1.0" encoding="utf-8"?>
 <a:theme xmlns:a="http://schemas.openxmlformats.org/drawingml/2006/main" xmlns:r="http://schemas.openxmlformats.org/officeDocument/2006/relationships" name="Custom Theme">
   <a:themeElements>
     <a:clrScheme name="Default">
@@ -10531,7 +11042,7 @@
 </a:theme>
 </file>
 
-<file path=ppt/theme/theme2.xml><?xml version="1.0" encoding="utf-8"?>
+<file path=ppt/theme/theme3.xml><?xml version="1.0" encoding="utf-8"?>
 <a:theme xmlns:a="http://schemas.openxmlformats.org/drawingml/2006/main" xmlns:r="http://schemas.openxmlformats.org/officeDocument/2006/relationships" name="Office Theme">
   <a:themeElements>
     <a:clrScheme name="Office">
@@ -10846,281 +11357,4 @@
     </a:lnDef>
   </a:objectDefaults>
 </a:theme>
-</file>
-
-<file path=ppt/theme/theme3.xml><?xml version="1.0" encoding="utf-8"?>
-<a:theme xmlns:a="http://schemas.openxmlformats.org/drawingml/2006/main" xmlns:r="http://schemas.openxmlformats.org/officeDocument/2006/relationships" name="modern">
-  <a:themeElements>
-    <a:clrScheme name="Custom 348">
-      <a:dk1>
-        <a:srgbClr val="000000"/>
-      </a:dk1>
-      <a:lt1>
-        <a:srgbClr val="FFFFFF"/>
-      </a:lt1>
-      <a:dk2>
-        <a:srgbClr val="191919"/>
-      </a:dk2>
-      <a:lt2>
-        <a:srgbClr val="CCCCCC"/>
-      </a:lt2>
-      <a:accent1>
-        <a:srgbClr val="7E5554"/>
-      </a:accent1>
-      <a:accent2>
-        <a:srgbClr val="910A10"/>
-      </a:accent2>
-      <a:accent3>
-        <a:srgbClr val="84294D"/>
-      </a:accent3>
-      <a:accent4>
-        <a:srgbClr val="DA823B"/>
-      </a:accent4>
-      <a:accent5>
-        <a:srgbClr val="625D3C"/>
-      </a:accent5>
-      <a:accent6>
-        <a:srgbClr val="00384A"/>
-      </a:accent6>
-      <a:hlink>
-        <a:srgbClr val="227A78"/>
-      </a:hlink>
-      <a:folHlink>
-        <a:srgbClr val="394749"/>
-      </a:folHlink>
-    </a:clrScheme>
-    <a:fontScheme name="Office">
-      <a:majorFont>
-        <a:latin typeface="Arial"/>
-        <a:ea typeface=""/>
-        <a:cs typeface=""/>
-        <a:font script="Jpan" typeface="ＭＳ Ｐゴシック"/>
-        <a:font script="Hang" typeface="맑은 고딕"/>
-        <a:font script="Hans" typeface="宋体"/>
-        <a:font script="Hant" typeface="新細明體"/>
-        <a:font script="Arab" typeface="Times New Roman"/>
-        <a:font script="Hebr" typeface="Times New Roman"/>
-        <a:font script="Thai" typeface="Angsana New"/>
-        <a:font script="Ethi" typeface="Nyala"/>
-        <a:font script="Beng" typeface="Vrinda"/>
-        <a:font script="Gujr" typeface="Shruti"/>
-        <a:font script="Khmr" typeface="MoolBoran"/>
-        <a:font script="Knda" typeface="Tunga"/>
-        <a:font script="Guru" typeface="Raavi"/>
-        <a:font script="Cans" typeface="Euphemia"/>
-        <a:font script="Cher" typeface="Plantagenet Cherokee"/>
-        <a:font script="Yiii" typeface="Microsoft Yi Baiti"/>
-        <a:font script="Tibt" typeface="Microsoft Himalaya"/>
-        <a:font script="Thaa" typeface="MV Boli"/>
-        <a:font script="Deva" typeface="Mangal"/>
-        <a:font script="Telu" typeface="Gautami"/>
-        <a:font script="Taml" typeface="Latha"/>
-        <a:font script="Syrc" typeface="Estrangelo Edessa"/>
-        <a:font script="Orya" typeface="Kalinga"/>
-        <a:font script="Mlym" typeface="Kartika"/>
-        <a:font script="Laoo" typeface="DokChampa"/>
-        <a:font script="Sinh" typeface="Iskoola Pota"/>
-        <a:font script="Mong" typeface="Mongolian Baiti"/>
-        <a:font script="Viet" typeface="Times New Roman"/>
-        <a:font script="Uigh" typeface="Microsoft Uighur"/>
-      </a:majorFont>
-      <a:minorFont>
-        <a:latin typeface="Arial"/>
-        <a:ea typeface=""/>
-        <a:cs typeface=""/>
-        <a:font script="Jpan" typeface="ＭＳ Ｐゴシック"/>
-        <a:font script="Hang" typeface="맑은 고딕"/>
-        <a:font script="Hans" typeface="宋体"/>
-        <a:font script="Hant" typeface="新細明體"/>
-        <a:font script="Arab" typeface="Times New Roman"/>
-        <a:font script="Hebr" typeface="Times New Roman"/>
-        <a:font script="Thai" typeface="Angsana New"/>
-        <a:font script="Ethi" typeface="Nyala"/>
-        <a:font script="Beng" typeface="Vrinda"/>
-        <a:font script="Gujr" typeface="Shruti"/>
-        <a:font script="Khmr" typeface="MoolBoran"/>
-        <a:font script="Knda" typeface="Tunga"/>
-        <a:font script="Guru" typeface="Raavi"/>
-        <a:font script="Cans" typeface="Euphemia"/>
-        <a:font script="Cher" typeface="Plantagenet Cherokee"/>
-        <a:font script="Yiii" typeface="Microsoft Yi Baiti"/>
-        <a:font script="Tibt" typeface="Microsoft Himalaya"/>
-        <a:font script="Thaa" typeface="MV Boli"/>
-        <a:font script="Deva" typeface="Mangal"/>
-        <a:font script="Telu" typeface="Gautami"/>
-        <a:font script="Taml" typeface="Latha"/>
-        <a:font script="Syrc" typeface="Estrangelo Edessa"/>
-        <a:font script="Orya" typeface="Kalinga"/>
-        <a:font script="Mlym" typeface="Kartika"/>
-        <a:font script="Laoo" typeface="DokChampa"/>
-        <a:font script="Sinh" typeface="Iskoola Pota"/>
-        <a:font script="Mong" typeface="Mongolian Baiti"/>
-        <a:font script="Viet" typeface="Times New Roman"/>
-        <a:font script="Uigh" typeface="Microsoft Uighur"/>
-      </a:minorFont>
-    </a:fontScheme>
-    <a:fmtScheme name="Office">
-      <a:fillStyleLst>
-        <a:solidFill>
-          <a:schemeClr val="phClr"/>
-        </a:solidFill>
-        <a:gradFill rotWithShape="1">
-          <a:gsLst>
-            <a:gs pos="0">
-              <a:schemeClr val="phClr">
-                <a:tint val="50000"/>
-                <a:satMod val="300000"/>
-              </a:schemeClr>
-            </a:gs>
-            <a:gs pos="35000">
-              <a:schemeClr val="phClr">
-                <a:tint val="37000"/>
-                <a:satMod val="300000"/>
-              </a:schemeClr>
-            </a:gs>
-            <a:gs pos="100000">
-              <a:schemeClr val="phClr">
-                <a:tint val="15000"/>
-                <a:satMod val="350000"/>
-              </a:schemeClr>
-            </a:gs>
-          </a:gsLst>
-          <a:lin ang="16200000" scaled="1"/>
-        </a:gradFill>
-        <a:gradFill rotWithShape="1">
-          <a:gsLst>
-            <a:gs pos="0">
-              <a:schemeClr val="phClr">
-                <a:tint val="100000"/>
-                <a:shade val="100000"/>
-                <a:satMod val="130000"/>
-              </a:schemeClr>
-            </a:gs>
-            <a:gs pos="100000">
-              <a:schemeClr val="phClr">
-                <a:tint val="50000"/>
-                <a:shade val="100000"/>
-                <a:satMod val="350000"/>
-              </a:schemeClr>
-            </a:gs>
-          </a:gsLst>
-          <a:lin ang="16200000" scaled="0"/>
-        </a:gradFill>
-      </a:fillStyleLst>
-      <a:lnStyleLst>
-        <a:ln cap="flat" cmpd="sng" w="9525" algn="ctr">
-          <a:solidFill>
-            <a:schemeClr val="phClr">
-              <a:shade val="95000"/>
-              <a:satMod val="105000"/>
-            </a:schemeClr>
-          </a:solidFill>
-          <a:prstDash val="solid"/>
-        </a:ln>
-        <a:ln cap="flat" cmpd="sng" w="25400" algn="ctr">
-          <a:solidFill>
-            <a:schemeClr val="phClr"/>
-          </a:solidFill>
-          <a:prstDash val="solid"/>
-        </a:ln>
-        <a:ln cap="flat" cmpd="sng" w="38100" algn="ctr">
-          <a:solidFill>
-            <a:schemeClr val="phClr"/>
-          </a:solidFill>
-          <a:prstDash val="solid"/>
-        </a:ln>
-      </a:lnStyleLst>
-      <a:effectStyleLst>
-        <a:effectStyle>
-          <a:effectLst>
-            <a:outerShdw blurRad="40000" rotWithShape="0" dir="5400000" dist="20000">
-              <a:srgbClr val="000000">
-                <a:alpha val="38000"/>
-              </a:srgbClr>
-            </a:outerShdw>
-          </a:effectLst>
-        </a:effectStyle>
-        <a:effectStyle>
-          <a:effectLst>
-            <a:outerShdw blurRad="40000" rotWithShape="0" dir="5400000" dist="23000">
-              <a:srgbClr val="000000">
-                <a:alpha val="35000"/>
-              </a:srgbClr>
-            </a:outerShdw>
-          </a:effectLst>
-        </a:effectStyle>
-        <a:effectStyle>
-          <a:effectLst>
-            <a:outerShdw blurRad="40000" rotWithShape="0" dir="5400000" dist="23000">
-              <a:srgbClr val="000000">
-                <a:alpha val="35000"/>
-              </a:srgbClr>
-            </a:outerShdw>
-          </a:effectLst>
-          <a:scene3d>
-            <a:camera prst="orthographicFront">
-              <a:rot lat="0" lon="0" rev="0"/>
-            </a:camera>
-            <a:lightRig dir="t" rig="threePt">
-              <a:rot lat="0" lon="0" rev="1200000"/>
-            </a:lightRig>
-          </a:scene3d>
-          <a:sp3d>
-            <a:bevelT h="25400" w="63500"/>
-          </a:sp3d>
-        </a:effectStyle>
-      </a:effectStyleLst>
-      <a:bgFillStyleLst>
-        <a:solidFill>
-          <a:schemeClr val="phClr"/>
-        </a:solidFill>
-        <a:gradFill rotWithShape="1">
-          <a:gsLst>
-            <a:gs pos="0">
-              <a:schemeClr val="phClr">
-                <a:tint val="40000"/>
-                <a:satMod val="350000"/>
-              </a:schemeClr>
-            </a:gs>
-            <a:gs pos="40000">
-              <a:schemeClr val="phClr">
-                <a:tint val="45000"/>
-                <a:shade val="99000"/>
-                <a:satMod val="350000"/>
-              </a:schemeClr>
-            </a:gs>
-            <a:gs pos="100000">
-              <a:schemeClr val="phClr">
-                <a:shade val="20000"/>
-                <a:satMod val="255000"/>
-              </a:schemeClr>
-            </a:gs>
-          </a:gsLst>
-          <a:path path="circle">
-            <a:fillToRect b="180000" l="50000" r="50000" t="-80000"/>
-          </a:path>
-        </a:gradFill>
-        <a:gradFill rotWithShape="1">
-          <a:gsLst>
-            <a:gs pos="0">
-              <a:schemeClr val="phClr">
-                <a:tint val="80000"/>
-                <a:satMod val="300000"/>
-              </a:schemeClr>
-            </a:gs>
-            <a:gs pos="100000">
-              <a:schemeClr val="phClr">
-                <a:shade val="30000"/>
-                <a:satMod val="200000"/>
-              </a:schemeClr>
-            </a:gs>
-          </a:gsLst>
-          <a:path path="circle">
-            <a:fillToRect b="50000" l="50000" r="50000" t="50000"/>
-          </a:path>
-        </a:gradFill>
-      </a:bgFillStyleLst>
-    </a:fmtScheme>
-  </a:themeElements>
-</a:theme>
 </file>
</xml_diff>